<commit_message>
Update notebook and assets folder for use case
</commit_message>
<xml_diff>
--- a/tutorial/use_case_demo/assets/Anovos Use Case Presentation.pptx
+++ b/tutorial/use_case_demo/assets/Anovos Use Case Presentation.pptx
@@ -131,7 +131,8 @@
 <file path=ppt/revisionInfo.xml><?xml version="1.0" encoding="utf-8"?>
 <p1510:revInfo xmlns:a="http://schemas.openxmlformats.org/drawingml/2006/main" xmlns:r="http://schemas.openxmlformats.org/officeDocument/2006/relationships" xmlns:p1510="http://schemas.microsoft.com/office/powerpoint/2015/10/main">
   <p1510:revLst>
-    <p1510:client id="{8F8D5907-36EA-C14A-9466-85BE394ADC97}" v="64" dt="2022-03-21T02:52:52.189"/>
+    <p1510:client id="{7F9B3CD0-F58F-964A-B0FD-528AAB98ABDF}" v="45" dt="2022-03-21T21:09:54.193"/>
+    <p1510:client id="{814F9AAF-B235-4145-B452-01CCF55E0F8A}" v="1" dt="2022-03-22T09:48:54.561"/>
   </p1510:revLst>
 </p1510:revInfo>
 </file>
@@ -139,738 +140,26 @@
 <file path=ppt/changesInfos/changesInfo1.xml><?xml version="1.0" encoding="utf-8"?>
 <pc:chgInfo xmlns:a="http://schemas.openxmlformats.org/drawingml/2006/main" xmlns:r="http://schemas.openxmlformats.org/officeDocument/2006/relationships" xmlns:ac="http://schemas.microsoft.com/office/drawing/2013/main/command" xmlns:pc="http://schemas.microsoft.com/office/powerpoint/2013/main/command">
   <pc:docChgLst>
-    <pc:chgData name="Sinuo Chen" userId="3dace1ba-4a10-4eb3-a791-b35dca6600ed" providerId="ADAL" clId="{8F8D5907-36EA-C14A-9466-85BE394ADC97}"/>
-    <pc:docChg chg="undo custSel addSld delSld modSld sldOrd">
-      <pc:chgData name="Sinuo Chen" userId="3dace1ba-4a10-4eb3-a791-b35dca6600ed" providerId="ADAL" clId="{8F8D5907-36EA-C14A-9466-85BE394ADC97}" dt="2022-03-21T02:53:05.922" v="623" actId="1076"/>
+    <pc:chgData name="Sinuo Chen" userId="3dace1ba-4a10-4eb3-a791-b35dca6600ed" providerId="ADAL" clId="{814F9AAF-B235-4145-B452-01CCF55E0F8A}"/>
+    <pc:docChg chg="modSld">
+      <pc:chgData name="Sinuo Chen" userId="3dace1ba-4a10-4eb3-a791-b35dca6600ed" providerId="ADAL" clId="{814F9AAF-B235-4145-B452-01CCF55E0F8A}" dt="2022-03-22T09:48:54.561" v="8"/>
       <pc:docMkLst>
         <pc:docMk/>
       </pc:docMkLst>
       <pc:sldChg chg="modSp mod">
-        <pc:chgData name="Sinuo Chen" userId="3dace1ba-4a10-4eb3-a791-b35dca6600ed" providerId="ADAL" clId="{8F8D5907-36EA-C14A-9466-85BE394ADC97}" dt="2022-03-16T09:54:31.304" v="16" actId="1076"/>
-        <pc:sldMkLst>
-          <pc:docMk/>
-          <pc:sldMk cId="0" sldId="256"/>
-        </pc:sldMkLst>
-        <pc:spChg chg="mod">
-          <ac:chgData name="Sinuo Chen" userId="3dace1ba-4a10-4eb3-a791-b35dca6600ed" providerId="ADAL" clId="{8F8D5907-36EA-C14A-9466-85BE394ADC97}" dt="2022-03-16T09:53:32.090" v="5" actId="20577"/>
-          <ac:spMkLst>
-            <pc:docMk/>
-            <pc:sldMk cId="0" sldId="256"/>
-            <ac:spMk id="2" creationId="{00000000-0000-0000-0000-000000000000}"/>
-          </ac:spMkLst>
-        </pc:spChg>
-        <pc:spChg chg="mod">
-          <ac:chgData name="Sinuo Chen" userId="3dace1ba-4a10-4eb3-a791-b35dca6600ed" providerId="ADAL" clId="{8F8D5907-36EA-C14A-9466-85BE394ADC97}" dt="2022-03-16T09:54:31.304" v="16" actId="1076"/>
-          <ac:spMkLst>
-            <pc:docMk/>
-            <pc:sldMk cId="0" sldId="256"/>
-            <ac:spMk id="3" creationId="{00000000-0000-0000-0000-000000000000}"/>
-          </ac:spMkLst>
-        </pc:spChg>
-      </pc:sldChg>
-      <pc:sldChg chg="del ord">
-        <pc:chgData name="Sinuo Chen" userId="3dace1ba-4a10-4eb3-a791-b35dca6600ed" providerId="ADAL" clId="{8F8D5907-36EA-C14A-9466-85BE394ADC97}" dt="2022-03-16T10:01:47.677" v="190" actId="2696"/>
-        <pc:sldMkLst>
-          <pc:docMk/>
-          <pc:sldMk cId="0" sldId="257"/>
-        </pc:sldMkLst>
-      </pc:sldChg>
-      <pc:sldChg chg="addSp modSp mod">
-        <pc:chgData name="Sinuo Chen" userId="3dace1ba-4a10-4eb3-a791-b35dca6600ed" providerId="ADAL" clId="{8F8D5907-36EA-C14A-9466-85BE394ADC97}" dt="2022-03-18T08:42:29.596" v="614" actId="20577"/>
-        <pc:sldMkLst>
-          <pc:docMk/>
-          <pc:sldMk cId="0" sldId="258"/>
-        </pc:sldMkLst>
-        <pc:spChg chg="mod">
-          <ac:chgData name="Sinuo Chen" userId="3dace1ba-4a10-4eb3-a791-b35dca6600ed" providerId="ADAL" clId="{8F8D5907-36EA-C14A-9466-85BE394ADC97}" dt="2022-03-18T08:42:29.596" v="614" actId="20577"/>
-          <ac:spMkLst>
-            <pc:docMk/>
-            <pc:sldMk cId="0" sldId="258"/>
-            <ac:spMk id="2" creationId="{00000000-0000-0000-0000-000000000000}"/>
-          </ac:spMkLst>
-        </pc:spChg>
-        <pc:spChg chg="add mod">
-          <ac:chgData name="Sinuo Chen" userId="3dace1ba-4a10-4eb3-a791-b35dca6600ed" providerId="ADAL" clId="{8F8D5907-36EA-C14A-9466-85BE394ADC97}" dt="2022-03-16T09:57:45.673" v="120" actId="1076"/>
-          <ac:spMkLst>
-            <pc:docMk/>
-            <pc:sldMk cId="0" sldId="258"/>
-            <ac:spMk id="3" creationId="{B1D40A49-DC3E-374D-A925-F8E5C84A18DC}"/>
-          </ac:spMkLst>
-        </pc:spChg>
-        <pc:picChg chg="add mod modCrop">
-          <ac:chgData name="Sinuo Chen" userId="3dace1ba-4a10-4eb3-a791-b35dca6600ed" providerId="ADAL" clId="{8F8D5907-36EA-C14A-9466-85BE394ADC97}" dt="2022-03-16T09:57:09.776" v="87" actId="1076"/>
-          <ac:picMkLst>
-            <pc:docMk/>
-            <pc:sldMk cId="0" sldId="258"/>
-            <ac:picMk id="4" creationId="{645DA7F4-DF09-2E4F-91E2-D4F045CF98BF}"/>
-          </ac:picMkLst>
-        </pc:picChg>
-      </pc:sldChg>
-      <pc:sldChg chg="addSp delSp modSp mod ord">
-        <pc:chgData name="Sinuo Chen" userId="3dace1ba-4a10-4eb3-a791-b35dca6600ed" providerId="ADAL" clId="{8F8D5907-36EA-C14A-9466-85BE394ADC97}" dt="2022-03-21T02:53:05.922" v="623" actId="1076"/>
-        <pc:sldMkLst>
-          <pc:docMk/>
-          <pc:sldMk cId="0" sldId="259"/>
-        </pc:sldMkLst>
-        <pc:spChg chg="mod">
-          <ac:chgData name="Sinuo Chen" userId="3dace1ba-4a10-4eb3-a791-b35dca6600ed" providerId="ADAL" clId="{8F8D5907-36EA-C14A-9466-85BE394ADC97}" dt="2022-03-16T10:01:53.187" v="191" actId="1076"/>
-          <ac:spMkLst>
-            <pc:docMk/>
-            <pc:sldMk cId="0" sldId="259"/>
-            <ac:spMk id="3" creationId="{00000000-0000-0000-0000-000000000000}"/>
-          </ac:spMkLst>
-        </pc:spChg>
-        <pc:picChg chg="add del mod">
-          <ac:chgData name="Sinuo Chen" userId="3dace1ba-4a10-4eb3-a791-b35dca6600ed" providerId="ADAL" clId="{8F8D5907-36EA-C14A-9466-85BE394ADC97}" dt="2022-03-21T02:52:46.191" v="615" actId="478"/>
-          <ac:picMkLst>
-            <pc:docMk/>
-            <pc:sldMk cId="0" sldId="259"/>
-            <ac:picMk id="4" creationId="{76828B93-8E33-3643-9122-60FAB14A1FAC}"/>
-          </ac:picMkLst>
-        </pc:picChg>
-        <pc:picChg chg="add mod">
-          <ac:chgData name="Sinuo Chen" userId="3dace1ba-4a10-4eb3-a791-b35dca6600ed" providerId="ADAL" clId="{8F8D5907-36EA-C14A-9466-85BE394ADC97}" dt="2022-03-21T02:53:05.922" v="623" actId="1076"/>
-          <ac:picMkLst>
-            <pc:docMk/>
-            <pc:sldMk cId="0" sldId="259"/>
-            <ac:picMk id="5" creationId="{450E92BE-1630-FE43-860B-A219BBF372B1}"/>
-          </ac:picMkLst>
-        </pc:picChg>
-      </pc:sldChg>
-      <pc:sldChg chg="addSp delSp modSp mod">
-        <pc:chgData name="Sinuo Chen" userId="3dace1ba-4a10-4eb3-a791-b35dca6600ed" providerId="ADAL" clId="{8F8D5907-36EA-C14A-9466-85BE394ADC97}" dt="2022-03-18T07:10:43.557" v="356" actId="20577"/>
-        <pc:sldMkLst>
-          <pc:docMk/>
-          <pc:sldMk cId="0" sldId="260"/>
-        </pc:sldMkLst>
-        <pc:spChg chg="add mod">
-          <ac:chgData name="Sinuo Chen" userId="3dace1ba-4a10-4eb3-a791-b35dca6600ed" providerId="ADAL" clId="{8F8D5907-36EA-C14A-9466-85BE394ADC97}" dt="2022-03-18T07:10:43.557" v="356" actId="20577"/>
-          <ac:spMkLst>
-            <pc:docMk/>
-            <pc:sldMk cId="0" sldId="260"/>
-            <ac:spMk id="2" creationId="{24F92B56-B2FE-7147-BF37-A56193C01372}"/>
-          </ac:spMkLst>
-        </pc:spChg>
-        <pc:spChg chg="mod">
-          <ac:chgData name="Sinuo Chen" userId="3dace1ba-4a10-4eb3-a791-b35dca6600ed" providerId="ADAL" clId="{8F8D5907-36EA-C14A-9466-85BE394ADC97}" dt="2022-03-16T10:01:20.107" v="184" actId="1076"/>
-          <ac:spMkLst>
-            <pc:docMk/>
-            <pc:sldMk cId="0" sldId="260"/>
-            <ac:spMk id="3" creationId="{00000000-0000-0000-0000-000000000000}"/>
-          </ac:spMkLst>
-        </pc:spChg>
-        <pc:spChg chg="add del mod">
-          <ac:chgData name="Sinuo Chen" userId="3dace1ba-4a10-4eb3-a791-b35dca6600ed" providerId="ADAL" clId="{8F8D5907-36EA-C14A-9466-85BE394ADC97}" dt="2022-03-16T10:00:32.898" v="175"/>
-          <ac:spMkLst>
-            <pc:docMk/>
-            <pc:sldMk cId="0" sldId="260"/>
-            <ac:spMk id="4" creationId="{F42C291C-42C2-7E43-ABF2-EEA90AF47562}"/>
-          </ac:spMkLst>
-        </pc:spChg>
-        <pc:spChg chg="add mod">
-          <ac:chgData name="Sinuo Chen" userId="3dace1ba-4a10-4eb3-a791-b35dca6600ed" providerId="ADAL" clId="{8F8D5907-36EA-C14A-9466-85BE394ADC97}" dt="2022-03-18T07:09:48.020" v="340" actId="1076"/>
-          <ac:spMkLst>
-            <pc:docMk/>
-            <pc:sldMk cId="0" sldId="260"/>
-            <ac:spMk id="9" creationId="{D31E23BC-3114-C84D-A5B2-147EC4F50100}"/>
-          </ac:spMkLst>
-        </pc:spChg>
-        <pc:spChg chg="add mod">
-          <ac:chgData name="Sinuo Chen" userId="3dace1ba-4a10-4eb3-a791-b35dca6600ed" providerId="ADAL" clId="{8F8D5907-36EA-C14A-9466-85BE394ADC97}" dt="2022-03-18T07:09:53.254" v="341" actId="14100"/>
-          <ac:spMkLst>
-            <pc:docMk/>
-            <pc:sldMk cId="0" sldId="260"/>
-            <ac:spMk id="10" creationId="{F3AB7D54-3C65-1E4A-80DD-AC69EC280B4A}"/>
-          </ac:spMkLst>
-        </pc:spChg>
-        <pc:grpChg chg="add mod">
-          <ac:chgData name="Sinuo Chen" userId="3dace1ba-4a10-4eb3-a791-b35dca6600ed" providerId="ADAL" clId="{8F8D5907-36EA-C14A-9466-85BE394ADC97}" dt="2022-03-18T07:06:30.691" v="321" actId="1076"/>
-          <ac:grpSpMkLst>
-            <pc:docMk/>
-            <pc:sldMk cId="0" sldId="260"/>
-            <ac:grpSpMk id="8" creationId="{CF7C198D-4B89-E043-90B7-2DA73511CEF6}"/>
-          </ac:grpSpMkLst>
-        </pc:grpChg>
-        <pc:picChg chg="add mod">
-          <ac:chgData name="Sinuo Chen" userId="3dace1ba-4a10-4eb3-a791-b35dca6600ed" providerId="ADAL" clId="{8F8D5907-36EA-C14A-9466-85BE394ADC97}" dt="2022-03-18T07:01:48.593" v="250" actId="164"/>
-          <ac:picMkLst>
-            <pc:docMk/>
-            <pc:sldMk cId="0" sldId="260"/>
-            <ac:picMk id="5" creationId="{EF7D6355-6201-BC4D-8FE1-631EF83EE471}"/>
-          </ac:picMkLst>
-        </pc:picChg>
-        <pc:picChg chg="add mod">
-          <ac:chgData name="Sinuo Chen" userId="3dace1ba-4a10-4eb3-a791-b35dca6600ed" providerId="ADAL" clId="{8F8D5907-36EA-C14A-9466-85BE394ADC97}" dt="2022-03-18T07:01:48.593" v="250" actId="164"/>
-          <ac:picMkLst>
-            <pc:docMk/>
-            <pc:sldMk cId="0" sldId="260"/>
-            <ac:picMk id="7" creationId="{87389250-6A67-124B-A678-F9D712AEB917}"/>
-          </ac:picMkLst>
-        </pc:picChg>
-      </pc:sldChg>
-      <pc:sldChg chg="modSp del mod modShow">
-        <pc:chgData name="Sinuo Chen" userId="3dace1ba-4a10-4eb3-a791-b35dca6600ed" providerId="ADAL" clId="{8F8D5907-36EA-C14A-9466-85BE394ADC97}" dt="2022-03-18T07:41:53.364" v="427" actId="2696"/>
-        <pc:sldMkLst>
-          <pc:docMk/>
-          <pc:sldMk cId="771549457" sldId="261"/>
-        </pc:sldMkLst>
-        <pc:spChg chg="del">
-          <ac:chgData name="Sinuo Chen" userId="3dace1ba-4a10-4eb3-a791-b35dca6600ed" providerId="ADAL" clId="{8F8D5907-36EA-C14A-9466-85BE394ADC97}" dt="2022-03-16T10:03:01.564" v="210" actId="478"/>
-          <ac:spMkLst>
-            <pc:docMk/>
-            <pc:sldMk cId="771549457" sldId="261"/>
-            <ac:spMk id="2" creationId="{24F92B56-B2FE-7147-BF37-A56193C01372}"/>
-          </ac:spMkLst>
-        </pc:spChg>
-        <pc:spChg chg="mod">
-          <ac:chgData name="Sinuo Chen" userId="3dace1ba-4a10-4eb3-a791-b35dca6600ed" providerId="ADAL" clId="{8F8D5907-36EA-C14A-9466-85BE394ADC97}" dt="2022-03-16T10:02:56.871" v="209" actId="20577"/>
-          <ac:spMkLst>
-            <pc:docMk/>
-            <pc:sldMk cId="771549457" sldId="261"/>
-            <ac:spMk id="3" creationId="{00000000-0000-0000-0000-000000000000}"/>
-          </ac:spMkLst>
-        </pc:spChg>
-        <pc:picChg chg="add mod modCrop">
-          <ac:chgData name="Sinuo Chen" userId="3dace1ba-4a10-4eb3-a791-b35dca6600ed" providerId="ADAL" clId="{8F8D5907-36EA-C14A-9466-85BE394ADC97}" dt="2022-03-16T10:04:35.799" v="227" actId="1076"/>
-          <ac:picMkLst>
-            <pc:docMk/>
-            <pc:sldMk cId="771549457" sldId="261"/>
-            <ac:picMk id="5" creationId="{45476578-477A-5142-8D66-62E3894B7C53}"/>
-          </ac:picMkLst>
-        </pc:picChg>
-        <pc:picChg chg="mod">
-          <ac:chgData name="Sinuo Chen" userId="3dace1ba-4a10-4eb3-a791-b35dca6600ed" providerId="ADAL" clId="{8F8D5907-36EA-C14A-9466-85BE394ADC97}" dt="2022-03-18T07:35:22.334" v="358" actId="1076"/>
-          <ac:picMkLst>
-            <pc:docMk/>
-            <pc:sldMk cId="771549457" sldId="261"/>
-            <ac:picMk id="6" creationId="{F235B1CB-648E-DB4D-A192-C3A0D0283091}"/>
-          </ac:picMkLst>
-        </pc:picChg>
-      </pc:sldChg>
-      <pc:sldChg chg="addSp delSp modSp add del mod setBg">
-        <pc:chgData name="Sinuo Chen" userId="3dace1ba-4a10-4eb3-a791-b35dca6600ed" providerId="ADAL" clId="{8F8D5907-36EA-C14A-9466-85BE394ADC97}" dt="2022-03-18T07:58:11.460" v="458" actId="2696"/>
-        <pc:sldMkLst>
-          <pc:docMk/>
-          <pc:sldMk cId="2227815680" sldId="262"/>
-        </pc:sldMkLst>
-        <pc:spChg chg="mod">
-          <ac:chgData name="Sinuo Chen" userId="3dace1ba-4a10-4eb3-a791-b35dca6600ed" providerId="ADAL" clId="{8F8D5907-36EA-C14A-9466-85BE394ADC97}" dt="2022-03-18T07:41:48.475" v="426" actId="1076"/>
-          <ac:spMkLst>
-            <pc:docMk/>
-            <pc:sldMk cId="2227815680" sldId="262"/>
-            <ac:spMk id="3" creationId="{00000000-0000-0000-0000-000000000000}"/>
-          </ac:spMkLst>
-        </pc:spChg>
-        <pc:spChg chg="mod">
-          <ac:chgData name="Sinuo Chen" userId="3dace1ba-4a10-4eb3-a791-b35dca6600ed" providerId="ADAL" clId="{8F8D5907-36EA-C14A-9466-85BE394ADC97}" dt="2022-03-18T07:36:53.211" v="366" actId="255"/>
-          <ac:spMkLst>
-            <pc:docMk/>
-            <pc:sldMk cId="2227815680" sldId="262"/>
-            <ac:spMk id="8" creationId="{B065C8DF-7F06-9742-B704-4C1B998056BD}"/>
-          </ac:spMkLst>
-        </pc:spChg>
-        <pc:spChg chg="mod">
-          <ac:chgData name="Sinuo Chen" userId="3dace1ba-4a10-4eb3-a791-b35dca6600ed" providerId="ADAL" clId="{8F8D5907-36EA-C14A-9466-85BE394ADC97}" dt="2022-03-18T07:36:53.211" v="366" actId="255"/>
-          <ac:spMkLst>
-            <pc:docMk/>
-            <pc:sldMk cId="2227815680" sldId="262"/>
-            <ac:spMk id="9" creationId="{11453275-CD41-2B4F-84A8-59C2B8B9EBF2}"/>
-          </ac:spMkLst>
-        </pc:spChg>
-        <pc:spChg chg="mod">
-          <ac:chgData name="Sinuo Chen" userId="3dace1ba-4a10-4eb3-a791-b35dca6600ed" providerId="ADAL" clId="{8F8D5907-36EA-C14A-9466-85BE394ADC97}" dt="2022-03-18T07:36:53.211" v="366" actId="255"/>
-          <ac:spMkLst>
-            <pc:docMk/>
-            <pc:sldMk cId="2227815680" sldId="262"/>
-            <ac:spMk id="10" creationId="{937F6620-4B0F-4643-A184-1B2397719801}"/>
-          </ac:spMkLst>
-        </pc:spChg>
-        <pc:spChg chg="mod">
-          <ac:chgData name="Sinuo Chen" userId="3dace1ba-4a10-4eb3-a791-b35dca6600ed" providerId="ADAL" clId="{8F8D5907-36EA-C14A-9466-85BE394ADC97}" dt="2022-03-18T07:36:53.211" v="366" actId="255"/>
-          <ac:spMkLst>
-            <pc:docMk/>
-            <pc:sldMk cId="2227815680" sldId="262"/>
-            <ac:spMk id="11" creationId="{7E61DC81-69C3-004D-841F-2FCE21661AB7}"/>
-          </ac:spMkLst>
-        </pc:spChg>
-        <pc:spChg chg="mod">
-          <ac:chgData name="Sinuo Chen" userId="3dace1ba-4a10-4eb3-a791-b35dca6600ed" providerId="ADAL" clId="{8F8D5907-36EA-C14A-9466-85BE394ADC97}" dt="2022-03-18T07:36:53.211" v="366" actId="255"/>
-          <ac:spMkLst>
-            <pc:docMk/>
-            <pc:sldMk cId="2227815680" sldId="262"/>
-            <ac:spMk id="12" creationId="{EC1EFF55-C7A9-CF43-9E43-CADF15BDD1B7}"/>
-          </ac:spMkLst>
-        </pc:spChg>
-        <pc:spChg chg="mod">
-          <ac:chgData name="Sinuo Chen" userId="3dace1ba-4a10-4eb3-a791-b35dca6600ed" providerId="ADAL" clId="{8F8D5907-36EA-C14A-9466-85BE394ADC97}" dt="2022-03-18T07:36:53.211" v="366" actId="255"/>
-          <ac:spMkLst>
-            <pc:docMk/>
-            <pc:sldMk cId="2227815680" sldId="262"/>
-            <ac:spMk id="13" creationId="{6B7437BB-2CCA-A14C-8530-952AF1D621E8}"/>
-          </ac:spMkLst>
-        </pc:spChg>
-        <pc:spChg chg="mod">
-          <ac:chgData name="Sinuo Chen" userId="3dace1ba-4a10-4eb3-a791-b35dca6600ed" providerId="ADAL" clId="{8F8D5907-36EA-C14A-9466-85BE394ADC97}" dt="2022-03-18T07:36:53.211" v="366" actId="255"/>
-          <ac:spMkLst>
-            <pc:docMk/>
-            <pc:sldMk cId="2227815680" sldId="262"/>
-            <ac:spMk id="14" creationId="{C0E83980-8F5F-F842-BBB9-3BF236FBB435}"/>
-          </ac:spMkLst>
-        </pc:spChg>
-        <pc:spChg chg="mod">
-          <ac:chgData name="Sinuo Chen" userId="3dace1ba-4a10-4eb3-a791-b35dca6600ed" providerId="ADAL" clId="{8F8D5907-36EA-C14A-9466-85BE394ADC97}" dt="2022-03-18T07:36:53.211" v="366" actId="255"/>
-          <ac:spMkLst>
-            <pc:docMk/>
-            <pc:sldMk cId="2227815680" sldId="262"/>
-            <ac:spMk id="15" creationId="{7C151C4C-8CB8-C94C-850E-7ADA6D6C4DB6}"/>
-          </ac:spMkLst>
-        </pc:spChg>
-        <pc:spChg chg="mod">
-          <ac:chgData name="Sinuo Chen" userId="3dace1ba-4a10-4eb3-a791-b35dca6600ed" providerId="ADAL" clId="{8F8D5907-36EA-C14A-9466-85BE394ADC97}" dt="2022-03-18T07:36:53.211" v="366" actId="255"/>
-          <ac:spMkLst>
-            <pc:docMk/>
-            <pc:sldMk cId="2227815680" sldId="262"/>
-            <ac:spMk id="16" creationId="{EE2FEDB6-DC9C-B14A-9AC8-05B05DE6EC51}"/>
-          </ac:spMkLst>
-        </pc:spChg>
-        <pc:spChg chg="mod">
-          <ac:chgData name="Sinuo Chen" userId="3dace1ba-4a10-4eb3-a791-b35dca6600ed" providerId="ADAL" clId="{8F8D5907-36EA-C14A-9466-85BE394ADC97}" dt="2022-03-18T07:36:53.211" v="366" actId="255"/>
-          <ac:spMkLst>
-            <pc:docMk/>
-            <pc:sldMk cId="2227815680" sldId="262"/>
-            <ac:spMk id="17" creationId="{8962143E-7005-8D43-9EE0-86887EA58805}"/>
-          </ac:spMkLst>
-        </pc:spChg>
-        <pc:spChg chg="mod">
-          <ac:chgData name="Sinuo Chen" userId="3dace1ba-4a10-4eb3-a791-b35dca6600ed" providerId="ADAL" clId="{8F8D5907-36EA-C14A-9466-85BE394ADC97}" dt="2022-03-18T07:36:53.211" v="366" actId="255"/>
-          <ac:spMkLst>
-            <pc:docMk/>
-            <pc:sldMk cId="2227815680" sldId="262"/>
-            <ac:spMk id="18" creationId="{DA21A689-1B16-3B42-8AC3-5FF8B0031E34}"/>
-          </ac:spMkLst>
-        </pc:spChg>
-        <pc:spChg chg="mod">
-          <ac:chgData name="Sinuo Chen" userId="3dace1ba-4a10-4eb3-a791-b35dca6600ed" providerId="ADAL" clId="{8F8D5907-36EA-C14A-9466-85BE394ADC97}" dt="2022-03-18T07:36:59.615" v="368"/>
-          <ac:spMkLst>
-            <pc:docMk/>
-            <pc:sldMk cId="2227815680" sldId="262"/>
-            <ac:spMk id="20" creationId="{B8F32CCB-2EC3-C445-AB5F-82D959E84BAD}"/>
-          </ac:spMkLst>
-        </pc:spChg>
-        <pc:spChg chg="mod">
-          <ac:chgData name="Sinuo Chen" userId="3dace1ba-4a10-4eb3-a791-b35dca6600ed" providerId="ADAL" clId="{8F8D5907-36EA-C14A-9466-85BE394ADC97}" dt="2022-03-18T07:36:59.615" v="368"/>
-          <ac:spMkLst>
-            <pc:docMk/>
-            <pc:sldMk cId="2227815680" sldId="262"/>
-            <ac:spMk id="21" creationId="{5FB35285-BDEA-C54A-8E9A-60982B6E9220}"/>
-          </ac:spMkLst>
-        </pc:spChg>
-        <pc:spChg chg="mod">
-          <ac:chgData name="Sinuo Chen" userId="3dace1ba-4a10-4eb3-a791-b35dca6600ed" providerId="ADAL" clId="{8F8D5907-36EA-C14A-9466-85BE394ADC97}" dt="2022-03-18T07:36:59.615" v="368"/>
-          <ac:spMkLst>
-            <pc:docMk/>
-            <pc:sldMk cId="2227815680" sldId="262"/>
-            <ac:spMk id="22" creationId="{A2530714-9D00-F141-A2BB-EC5944D8415A}"/>
-          </ac:spMkLst>
-        </pc:spChg>
-        <pc:spChg chg="mod">
-          <ac:chgData name="Sinuo Chen" userId="3dace1ba-4a10-4eb3-a791-b35dca6600ed" providerId="ADAL" clId="{8F8D5907-36EA-C14A-9466-85BE394ADC97}" dt="2022-03-18T07:36:59.615" v="368"/>
-          <ac:spMkLst>
-            <pc:docMk/>
-            <pc:sldMk cId="2227815680" sldId="262"/>
-            <ac:spMk id="23" creationId="{A7701BA0-CB55-F34C-9E3D-86DF3A3ED057}"/>
-          </ac:spMkLst>
-        </pc:spChg>
-        <pc:spChg chg="mod">
-          <ac:chgData name="Sinuo Chen" userId="3dace1ba-4a10-4eb3-a791-b35dca6600ed" providerId="ADAL" clId="{8F8D5907-36EA-C14A-9466-85BE394ADC97}" dt="2022-03-18T07:36:59.615" v="368"/>
-          <ac:spMkLst>
-            <pc:docMk/>
-            <pc:sldMk cId="2227815680" sldId="262"/>
-            <ac:spMk id="24" creationId="{CE2AF07C-B818-8A4C-A0E2-304B6F0F22C5}"/>
-          </ac:spMkLst>
-        </pc:spChg>
-        <pc:spChg chg="mod">
-          <ac:chgData name="Sinuo Chen" userId="3dace1ba-4a10-4eb3-a791-b35dca6600ed" providerId="ADAL" clId="{8F8D5907-36EA-C14A-9466-85BE394ADC97}" dt="2022-03-18T07:36:59.615" v="368"/>
-          <ac:spMkLst>
-            <pc:docMk/>
-            <pc:sldMk cId="2227815680" sldId="262"/>
-            <ac:spMk id="25" creationId="{26F728FA-A781-5645-A476-1531B7DCE506}"/>
-          </ac:spMkLst>
-        </pc:spChg>
-        <pc:spChg chg="mod">
-          <ac:chgData name="Sinuo Chen" userId="3dace1ba-4a10-4eb3-a791-b35dca6600ed" providerId="ADAL" clId="{8F8D5907-36EA-C14A-9466-85BE394ADC97}" dt="2022-03-18T07:36:59.615" v="368"/>
-          <ac:spMkLst>
-            <pc:docMk/>
-            <pc:sldMk cId="2227815680" sldId="262"/>
-            <ac:spMk id="26" creationId="{A3787395-F922-124C-B82F-0D2D4AB64B29}"/>
-          </ac:spMkLst>
-        </pc:spChg>
-        <pc:spChg chg="mod">
-          <ac:chgData name="Sinuo Chen" userId="3dace1ba-4a10-4eb3-a791-b35dca6600ed" providerId="ADAL" clId="{8F8D5907-36EA-C14A-9466-85BE394ADC97}" dt="2022-03-18T07:36:59.615" v="368"/>
-          <ac:spMkLst>
-            <pc:docMk/>
-            <pc:sldMk cId="2227815680" sldId="262"/>
-            <ac:spMk id="27" creationId="{38984B00-543E-1648-B293-0D72657AD18E}"/>
-          </ac:spMkLst>
-        </pc:spChg>
-        <pc:spChg chg="mod">
-          <ac:chgData name="Sinuo Chen" userId="3dace1ba-4a10-4eb3-a791-b35dca6600ed" providerId="ADAL" clId="{8F8D5907-36EA-C14A-9466-85BE394ADC97}" dt="2022-03-18T07:36:59.615" v="368"/>
-          <ac:spMkLst>
-            <pc:docMk/>
-            <pc:sldMk cId="2227815680" sldId="262"/>
-            <ac:spMk id="28" creationId="{F3AC67FC-FEA2-5646-A186-6B75F01A3693}"/>
-          </ac:spMkLst>
-        </pc:spChg>
-        <pc:spChg chg="mod">
-          <ac:chgData name="Sinuo Chen" userId="3dace1ba-4a10-4eb3-a791-b35dca6600ed" providerId="ADAL" clId="{8F8D5907-36EA-C14A-9466-85BE394ADC97}" dt="2022-03-18T07:36:59.615" v="368"/>
-          <ac:spMkLst>
-            <pc:docMk/>
-            <pc:sldMk cId="2227815680" sldId="262"/>
-            <ac:spMk id="29" creationId="{6DA9D22A-CBAA-CB45-8823-63873B2C393A}"/>
-          </ac:spMkLst>
-        </pc:spChg>
-        <pc:spChg chg="mod">
-          <ac:chgData name="Sinuo Chen" userId="3dace1ba-4a10-4eb3-a791-b35dca6600ed" providerId="ADAL" clId="{8F8D5907-36EA-C14A-9466-85BE394ADC97}" dt="2022-03-18T07:36:59.615" v="368"/>
-          <ac:spMkLst>
-            <pc:docMk/>
-            <pc:sldMk cId="2227815680" sldId="262"/>
-            <ac:spMk id="30" creationId="{571545C4-D3DE-0441-97B7-0A0AAF313B07}"/>
-          </ac:spMkLst>
-        </pc:spChg>
-        <pc:spChg chg="mod topLvl">
-          <ac:chgData name="Sinuo Chen" userId="3dace1ba-4a10-4eb3-a791-b35dca6600ed" providerId="ADAL" clId="{8F8D5907-36EA-C14A-9466-85BE394ADC97}" dt="2022-03-18T07:39:31.586" v="393" actId="14100"/>
-          <ac:spMkLst>
-            <pc:docMk/>
-            <pc:sldMk cId="2227815680" sldId="262"/>
-            <ac:spMk id="32" creationId="{D5E7F83A-6C46-F147-AB1E-76F42F59E156}"/>
-          </ac:spMkLst>
-        </pc:spChg>
-        <pc:spChg chg="mod topLvl">
-          <ac:chgData name="Sinuo Chen" userId="3dace1ba-4a10-4eb3-a791-b35dca6600ed" providerId="ADAL" clId="{8F8D5907-36EA-C14A-9466-85BE394ADC97}" dt="2022-03-18T07:40:09.788" v="403" actId="14100"/>
-          <ac:spMkLst>
-            <pc:docMk/>
-            <pc:sldMk cId="2227815680" sldId="262"/>
-            <ac:spMk id="33" creationId="{E5A22E61-397F-2D4A-8B04-29FA73C436BE}"/>
-          </ac:spMkLst>
-        </pc:spChg>
-        <pc:spChg chg="mod topLvl">
-          <ac:chgData name="Sinuo Chen" userId="3dace1ba-4a10-4eb3-a791-b35dca6600ed" providerId="ADAL" clId="{8F8D5907-36EA-C14A-9466-85BE394ADC97}" dt="2022-03-18T07:38:45.288" v="385" actId="164"/>
-          <ac:spMkLst>
-            <pc:docMk/>
-            <pc:sldMk cId="2227815680" sldId="262"/>
-            <ac:spMk id="34" creationId="{DCEB6D83-29B1-264A-92CC-51B762A80FB0}"/>
-          </ac:spMkLst>
-        </pc:spChg>
-        <pc:spChg chg="mod topLvl">
-          <ac:chgData name="Sinuo Chen" userId="3dace1ba-4a10-4eb3-a791-b35dca6600ed" providerId="ADAL" clId="{8F8D5907-36EA-C14A-9466-85BE394ADC97}" dt="2022-03-18T07:38:31.323" v="383" actId="164"/>
-          <ac:spMkLst>
-            <pc:docMk/>
-            <pc:sldMk cId="2227815680" sldId="262"/>
-            <ac:spMk id="35" creationId="{677B68E9-16C3-FA45-9991-FBBAE06765EE}"/>
-          </ac:spMkLst>
-        </pc:spChg>
-        <pc:spChg chg="mod topLvl">
-          <ac:chgData name="Sinuo Chen" userId="3dace1ba-4a10-4eb3-a791-b35dca6600ed" providerId="ADAL" clId="{8F8D5907-36EA-C14A-9466-85BE394ADC97}" dt="2022-03-18T07:39:44.136" v="396" actId="14100"/>
-          <ac:spMkLst>
-            <pc:docMk/>
-            <pc:sldMk cId="2227815680" sldId="262"/>
-            <ac:spMk id="36" creationId="{FB8DEA73-98EB-3C4F-B203-27BB587FC618}"/>
-          </ac:spMkLst>
-        </pc:spChg>
-        <pc:spChg chg="mod topLvl">
-          <ac:chgData name="Sinuo Chen" userId="3dace1ba-4a10-4eb3-a791-b35dca6600ed" providerId="ADAL" clId="{8F8D5907-36EA-C14A-9466-85BE394ADC97}" dt="2022-03-18T07:40:10.277" v="404" actId="14100"/>
-          <ac:spMkLst>
-            <pc:docMk/>
-            <pc:sldMk cId="2227815680" sldId="262"/>
-            <ac:spMk id="37" creationId="{5BC39120-3880-4F4E-B65E-8C89811AD4A5}"/>
-          </ac:spMkLst>
-        </pc:spChg>
-        <pc:spChg chg="mod topLvl">
-          <ac:chgData name="Sinuo Chen" userId="3dace1ba-4a10-4eb3-a791-b35dca6600ed" providerId="ADAL" clId="{8F8D5907-36EA-C14A-9466-85BE394ADC97}" dt="2022-03-18T07:39:02.715" v="387" actId="164"/>
-          <ac:spMkLst>
-            <pc:docMk/>
-            <pc:sldMk cId="2227815680" sldId="262"/>
-            <ac:spMk id="38" creationId="{F904AB52-BCC8-9E46-A520-F559C7165C08}"/>
-          </ac:spMkLst>
-        </pc:spChg>
-        <pc:spChg chg="mod topLvl">
-          <ac:chgData name="Sinuo Chen" userId="3dace1ba-4a10-4eb3-a791-b35dca6600ed" providerId="ADAL" clId="{8F8D5907-36EA-C14A-9466-85BE394ADC97}" dt="2022-03-18T07:39:50.736" v="398" actId="14100"/>
-          <ac:spMkLst>
-            <pc:docMk/>
-            <pc:sldMk cId="2227815680" sldId="262"/>
-            <ac:spMk id="39" creationId="{10D33AE8-55AF-CF42-AF21-438EF2A8B6E0}"/>
-          </ac:spMkLst>
-        </pc:spChg>
-        <pc:spChg chg="mod topLvl">
-          <ac:chgData name="Sinuo Chen" userId="3dace1ba-4a10-4eb3-a791-b35dca6600ed" providerId="ADAL" clId="{8F8D5907-36EA-C14A-9466-85BE394ADC97}" dt="2022-03-18T07:41:46.947" v="425" actId="1076"/>
-          <ac:spMkLst>
-            <pc:docMk/>
-            <pc:sldMk cId="2227815680" sldId="262"/>
-            <ac:spMk id="40" creationId="{57D0D544-AA98-4140-ADA2-0DD4C7ABBF2B}"/>
-          </ac:spMkLst>
-        </pc:spChg>
-        <pc:spChg chg="mod topLvl">
-          <ac:chgData name="Sinuo Chen" userId="3dace1ba-4a10-4eb3-a791-b35dca6600ed" providerId="ADAL" clId="{8F8D5907-36EA-C14A-9466-85BE394ADC97}" dt="2022-03-18T07:41:46.947" v="425" actId="1076"/>
-          <ac:spMkLst>
-            <pc:docMk/>
-            <pc:sldMk cId="2227815680" sldId="262"/>
-            <ac:spMk id="41" creationId="{703416AB-1A5B-AC4A-9619-52CB981BCF61}"/>
-          </ac:spMkLst>
-        </pc:spChg>
-        <pc:spChg chg="mod topLvl">
-          <ac:chgData name="Sinuo Chen" userId="3dace1ba-4a10-4eb3-a791-b35dca6600ed" providerId="ADAL" clId="{8F8D5907-36EA-C14A-9466-85BE394ADC97}" dt="2022-03-18T07:41:46.947" v="425" actId="1076"/>
-          <ac:spMkLst>
-            <pc:docMk/>
-            <pc:sldMk cId="2227815680" sldId="262"/>
-            <ac:spMk id="42" creationId="{87B0EACD-BA32-7A40-A435-3FAF4168B854}"/>
-          </ac:spMkLst>
-        </pc:spChg>
-        <pc:grpChg chg="add mod">
-          <ac:chgData name="Sinuo Chen" userId="3dace1ba-4a10-4eb3-a791-b35dca6600ed" providerId="ADAL" clId="{8F8D5907-36EA-C14A-9466-85BE394ADC97}" dt="2022-03-18T07:41:46.947" v="425" actId="1076"/>
-          <ac:grpSpMkLst>
-            <pc:docMk/>
-            <pc:sldMk cId="2227815680" sldId="262"/>
-            <ac:grpSpMk id="2" creationId="{AE49AB28-B4C2-2E49-9C93-23C85D9C8868}"/>
-          </ac:grpSpMkLst>
-        </pc:grpChg>
-        <pc:grpChg chg="add mod">
-          <ac:chgData name="Sinuo Chen" userId="3dace1ba-4a10-4eb3-a791-b35dca6600ed" providerId="ADAL" clId="{8F8D5907-36EA-C14A-9466-85BE394ADC97}" dt="2022-03-18T07:41:46.947" v="425" actId="1076"/>
-          <ac:grpSpMkLst>
-            <pc:docMk/>
-            <pc:sldMk cId="2227815680" sldId="262"/>
-            <ac:grpSpMk id="4" creationId="{985668A8-7540-4C4B-826F-BE760C1F02B8}"/>
-          </ac:grpSpMkLst>
-        </pc:grpChg>
-        <pc:grpChg chg="add del mod">
-          <ac:chgData name="Sinuo Chen" userId="3dace1ba-4a10-4eb3-a791-b35dca6600ed" providerId="ADAL" clId="{8F8D5907-36EA-C14A-9466-85BE394ADC97}" dt="2022-03-18T07:36:58.077" v="367" actId="478"/>
-          <ac:grpSpMkLst>
-            <pc:docMk/>
-            <pc:sldMk cId="2227815680" sldId="262"/>
-            <ac:grpSpMk id="7" creationId="{5792E52B-08FA-C44B-A357-1567E61C8F8D}"/>
-          </ac:grpSpMkLst>
-        </pc:grpChg>
-        <pc:grpChg chg="add del mod">
-          <ac:chgData name="Sinuo Chen" userId="3dace1ba-4a10-4eb3-a791-b35dca6600ed" providerId="ADAL" clId="{8F8D5907-36EA-C14A-9466-85BE394ADC97}" dt="2022-03-18T07:37:04.783" v="369"/>
-          <ac:grpSpMkLst>
-            <pc:docMk/>
-            <pc:sldMk cId="2227815680" sldId="262"/>
-            <ac:grpSpMk id="19" creationId="{5806987C-4953-7142-B8BE-A39AEB115845}"/>
-          </ac:grpSpMkLst>
-        </pc:grpChg>
-        <pc:grpChg chg="add del mod">
-          <ac:chgData name="Sinuo Chen" userId="3dace1ba-4a10-4eb3-a791-b35dca6600ed" providerId="ADAL" clId="{8F8D5907-36EA-C14A-9466-85BE394ADC97}" dt="2022-03-18T07:37:33.559" v="373" actId="165"/>
-          <ac:grpSpMkLst>
-            <pc:docMk/>
-            <pc:sldMk cId="2227815680" sldId="262"/>
-            <ac:grpSpMk id="31" creationId="{40D86981-A3C5-DA40-B78F-CEA30BB95C30}"/>
-          </ac:grpSpMkLst>
-        </pc:grpChg>
-        <pc:grpChg chg="add mod">
-          <ac:chgData name="Sinuo Chen" userId="3dace1ba-4a10-4eb3-a791-b35dca6600ed" providerId="ADAL" clId="{8F8D5907-36EA-C14A-9466-85BE394ADC97}" dt="2022-03-18T07:41:46.947" v="425" actId="1076"/>
-          <ac:grpSpMkLst>
-            <pc:docMk/>
-            <pc:sldMk cId="2227815680" sldId="262"/>
-            <ac:grpSpMk id="43" creationId="{6ACB40E9-C61C-AC4E-B9CC-B9CE0AC3427A}"/>
-          </ac:grpSpMkLst>
-        </pc:grpChg>
-        <pc:grpChg chg="add mod">
-          <ac:chgData name="Sinuo Chen" userId="3dace1ba-4a10-4eb3-a791-b35dca6600ed" providerId="ADAL" clId="{8F8D5907-36EA-C14A-9466-85BE394ADC97}" dt="2022-03-18T07:41:46.947" v="425" actId="1076"/>
-          <ac:grpSpMkLst>
-            <pc:docMk/>
-            <pc:sldMk cId="2227815680" sldId="262"/>
-            <ac:grpSpMk id="44" creationId="{6B525513-4A09-8644-A495-A90ACF789702}"/>
-          </ac:grpSpMkLst>
-        </pc:grpChg>
-        <pc:picChg chg="del">
-          <ac:chgData name="Sinuo Chen" userId="3dace1ba-4a10-4eb3-a791-b35dca6600ed" providerId="ADAL" clId="{8F8D5907-36EA-C14A-9466-85BE394ADC97}" dt="2022-03-18T07:36:39.621" v="360" actId="478"/>
-          <ac:picMkLst>
-            <pc:docMk/>
-            <pc:sldMk cId="2227815680" sldId="262"/>
-            <ac:picMk id="5" creationId="{45476578-477A-5142-8D66-62E3894B7C53}"/>
-          </ac:picMkLst>
-        </pc:picChg>
-        <pc:picChg chg="del">
-          <ac:chgData name="Sinuo Chen" userId="3dace1ba-4a10-4eb3-a791-b35dca6600ed" providerId="ADAL" clId="{8F8D5907-36EA-C14A-9466-85BE394ADC97}" dt="2022-03-18T07:36:40.634" v="361" actId="478"/>
-          <ac:picMkLst>
-            <pc:docMk/>
-            <pc:sldMk cId="2227815680" sldId="262"/>
-            <ac:picMk id="6" creationId="{F235B1CB-648E-DB4D-A192-C3A0D0283091}"/>
-          </ac:picMkLst>
-        </pc:picChg>
-      </pc:sldChg>
-      <pc:sldChg chg="addSp delSp modSp new mod">
-        <pc:chgData name="Sinuo Chen" userId="3dace1ba-4a10-4eb3-a791-b35dca6600ed" providerId="ADAL" clId="{8F8D5907-36EA-C14A-9466-85BE394ADC97}" dt="2022-03-18T08:34:03.312" v="609" actId="1076"/>
+        <pc:chgData name="Sinuo Chen" userId="3dace1ba-4a10-4eb3-a791-b35dca6600ed" providerId="ADAL" clId="{814F9AAF-B235-4145-B452-01CCF55E0F8A}" dt="2022-03-22T09:48:54.561" v="8"/>
         <pc:sldMkLst>
           <pc:docMk/>
           <pc:sldMk cId="2176850993" sldId="263"/>
         </pc:sldMkLst>
-        <pc:spChg chg="del mod">
-          <ac:chgData name="Sinuo Chen" userId="3dace1ba-4a10-4eb3-a791-b35dca6600ed" providerId="ADAL" clId="{8F8D5907-36EA-C14A-9466-85BE394ADC97}" dt="2022-03-18T07:55:46.513" v="444" actId="478"/>
-          <ac:spMkLst>
-            <pc:docMk/>
-            <pc:sldMk cId="2176850993" sldId="263"/>
-            <ac:spMk id="2" creationId="{CA8CC2F8-6CCD-C040-BB83-10B7B0EDAE49}"/>
-          </ac:spMkLst>
-        </pc:spChg>
-        <pc:spChg chg="add mod">
-          <ac:chgData name="Sinuo Chen" userId="3dace1ba-4a10-4eb3-a791-b35dca6600ed" providerId="ADAL" clId="{8F8D5907-36EA-C14A-9466-85BE394ADC97}" dt="2022-03-18T07:56:36.813" v="448" actId="1076"/>
-          <ac:spMkLst>
-            <pc:docMk/>
-            <pc:sldMk cId="2176850993" sldId="263"/>
-            <ac:spMk id="3" creationId="{78131358-5E7E-F942-A62F-7610D33D7AB5}"/>
-          </ac:spMkLst>
-        </pc:spChg>
         <pc:spChg chg="mod">
-          <ac:chgData name="Sinuo Chen" userId="3dace1ba-4a10-4eb3-a791-b35dca6600ed" providerId="ADAL" clId="{8F8D5907-36EA-C14A-9466-85BE394ADC97}" dt="2022-03-18T08:33:41.272" v="606" actId="2711"/>
-          <ac:spMkLst>
-            <pc:docMk/>
-            <pc:sldMk cId="2176850993" sldId="263"/>
-            <ac:spMk id="5" creationId="{6FD6C937-941C-E040-B157-FC55E858F16E}"/>
-          </ac:spMkLst>
-        </pc:spChg>
-        <pc:spChg chg="mod">
-          <ac:chgData name="Sinuo Chen" userId="3dace1ba-4a10-4eb3-a791-b35dca6600ed" providerId="ADAL" clId="{8F8D5907-36EA-C14A-9466-85BE394ADC97}" dt="2022-03-18T08:33:41.272" v="606" actId="2711"/>
-          <ac:spMkLst>
-            <pc:docMk/>
-            <pc:sldMk cId="2176850993" sldId="263"/>
-            <ac:spMk id="6" creationId="{1CB97CC0-751C-F84F-849C-032AEF6156CE}"/>
-          </ac:spMkLst>
-        </pc:spChg>
-        <pc:spChg chg="mod">
-          <ac:chgData name="Sinuo Chen" userId="3dace1ba-4a10-4eb3-a791-b35dca6600ed" providerId="ADAL" clId="{8F8D5907-36EA-C14A-9466-85BE394ADC97}" dt="2022-03-18T08:33:41.272" v="606" actId="2711"/>
-          <ac:spMkLst>
-            <pc:docMk/>
-            <pc:sldMk cId="2176850993" sldId="263"/>
-            <ac:spMk id="8" creationId="{FAAC2680-CA9D-0944-BCFA-370961600005}"/>
-          </ac:spMkLst>
-        </pc:spChg>
-        <pc:spChg chg="mod">
-          <ac:chgData name="Sinuo Chen" userId="3dace1ba-4a10-4eb3-a791-b35dca6600ed" providerId="ADAL" clId="{8F8D5907-36EA-C14A-9466-85BE394ADC97}" dt="2022-03-18T08:33:41.272" v="606" actId="2711"/>
-          <ac:spMkLst>
-            <pc:docMk/>
-            <pc:sldMk cId="2176850993" sldId="263"/>
-            <ac:spMk id="9" creationId="{466E6C9F-0BF1-694E-9B62-F762A1500B4F}"/>
-          </ac:spMkLst>
-        </pc:spChg>
-        <pc:spChg chg="mod">
-          <ac:chgData name="Sinuo Chen" userId="3dace1ba-4a10-4eb3-a791-b35dca6600ed" providerId="ADAL" clId="{8F8D5907-36EA-C14A-9466-85BE394ADC97}" dt="2022-03-18T08:33:41.272" v="606" actId="2711"/>
-          <ac:spMkLst>
-            <pc:docMk/>
-            <pc:sldMk cId="2176850993" sldId="263"/>
-            <ac:spMk id="11" creationId="{8CD8A400-C978-DC4C-9C28-90BD5B4F839B}"/>
-          </ac:spMkLst>
-        </pc:spChg>
-        <pc:spChg chg="mod">
-          <ac:chgData name="Sinuo Chen" userId="3dace1ba-4a10-4eb3-a791-b35dca6600ed" providerId="ADAL" clId="{8F8D5907-36EA-C14A-9466-85BE394ADC97}" dt="2022-03-18T08:33:41.272" v="606" actId="2711"/>
-          <ac:spMkLst>
-            <pc:docMk/>
-            <pc:sldMk cId="2176850993" sldId="263"/>
-            <ac:spMk id="12" creationId="{BD2376C3-F51C-B447-80A8-085A6D86E476}"/>
-          </ac:spMkLst>
-        </pc:spChg>
-        <pc:spChg chg="mod">
-          <ac:chgData name="Sinuo Chen" userId="3dace1ba-4a10-4eb3-a791-b35dca6600ed" providerId="ADAL" clId="{8F8D5907-36EA-C14A-9466-85BE394ADC97}" dt="2022-03-18T08:33:41.272" v="606" actId="2711"/>
-          <ac:spMkLst>
-            <pc:docMk/>
-            <pc:sldMk cId="2176850993" sldId="263"/>
-            <ac:spMk id="14" creationId="{129A4F81-83A9-DB49-A36D-328DAB2B8A68}"/>
-          </ac:spMkLst>
-        </pc:spChg>
-        <pc:spChg chg="mod">
-          <ac:chgData name="Sinuo Chen" userId="3dace1ba-4a10-4eb3-a791-b35dca6600ed" providerId="ADAL" clId="{8F8D5907-36EA-C14A-9466-85BE394ADC97}" dt="2022-03-18T08:33:52.364" v="607" actId="14100"/>
+          <ac:chgData name="Sinuo Chen" userId="3dace1ba-4a10-4eb3-a791-b35dca6600ed" providerId="ADAL" clId="{814F9AAF-B235-4145-B452-01CCF55E0F8A}" dt="2022-03-22T09:48:54.561" v="8"/>
           <ac:spMkLst>
             <pc:docMk/>
             <pc:sldMk cId="2176850993" sldId="263"/>
             <ac:spMk id="15" creationId="{1F5F9613-DF89-014F-89EE-3E8564B026F1}"/>
           </ac:spMkLst>
         </pc:spChg>
-        <pc:spChg chg="add mod">
-          <ac:chgData name="Sinuo Chen" userId="3dace1ba-4a10-4eb3-a791-b35dca6600ed" providerId="ADAL" clId="{8F8D5907-36EA-C14A-9466-85BE394ADC97}" dt="2022-03-18T08:33:41.272" v="606" actId="2711"/>
-          <ac:spMkLst>
-            <pc:docMk/>
-            <pc:sldMk cId="2176850993" sldId="263"/>
-            <ac:spMk id="16" creationId="{F390D5EC-7EF5-AE48-91DF-467EEE12D3CF}"/>
-          </ac:spMkLst>
-        </pc:spChg>
-        <pc:spChg chg="add mod">
-          <ac:chgData name="Sinuo Chen" userId="3dace1ba-4a10-4eb3-a791-b35dca6600ed" providerId="ADAL" clId="{8F8D5907-36EA-C14A-9466-85BE394ADC97}" dt="2022-03-18T08:33:41.272" v="606" actId="2711"/>
-          <ac:spMkLst>
-            <pc:docMk/>
-            <pc:sldMk cId="2176850993" sldId="263"/>
-            <ac:spMk id="17" creationId="{594894FF-685B-EB47-95CD-8C81502E8795}"/>
-          </ac:spMkLst>
-        </pc:spChg>
-        <pc:spChg chg="add mod">
-          <ac:chgData name="Sinuo Chen" userId="3dace1ba-4a10-4eb3-a791-b35dca6600ed" providerId="ADAL" clId="{8F8D5907-36EA-C14A-9466-85BE394ADC97}" dt="2022-03-18T08:34:03.312" v="609" actId="1076"/>
-          <ac:spMkLst>
-            <pc:docMk/>
-            <pc:sldMk cId="2176850993" sldId="263"/>
-            <ac:spMk id="18" creationId="{8043508E-BCEE-8244-8105-19D7B343B30B}"/>
-          </ac:spMkLst>
-        </pc:spChg>
-        <pc:grpChg chg="add mod">
-          <ac:chgData name="Sinuo Chen" userId="3dace1ba-4a10-4eb3-a791-b35dca6600ed" providerId="ADAL" clId="{8F8D5907-36EA-C14A-9466-85BE394ADC97}" dt="2022-03-18T07:57:15.516" v="456" actId="1076"/>
-          <ac:grpSpMkLst>
-            <pc:docMk/>
-            <pc:sldMk cId="2176850993" sldId="263"/>
-            <ac:grpSpMk id="4" creationId="{599490E8-2E74-3242-9250-A7AD0790D261}"/>
-          </ac:grpSpMkLst>
-        </pc:grpChg>
-        <pc:grpChg chg="add mod">
-          <ac:chgData name="Sinuo Chen" userId="3dace1ba-4a10-4eb3-a791-b35dca6600ed" providerId="ADAL" clId="{8F8D5907-36EA-C14A-9466-85BE394ADC97}" dt="2022-03-18T07:56:42.268" v="449" actId="1076"/>
-          <ac:grpSpMkLst>
-            <pc:docMk/>
-            <pc:sldMk cId="2176850993" sldId="263"/>
-            <ac:grpSpMk id="7" creationId="{29B34A4E-8BAF-9D41-9275-33D45A6C9188}"/>
-          </ac:grpSpMkLst>
-        </pc:grpChg>
-        <pc:grpChg chg="add mod">
-          <ac:chgData name="Sinuo Chen" userId="3dace1ba-4a10-4eb3-a791-b35dca6600ed" providerId="ADAL" clId="{8F8D5907-36EA-C14A-9466-85BE394ADC97}" dt="2022-03-18T08:33:57.546" v="608" actId="1076"/>
-          <ac:grpSpMkLst>
-            <pc:docMk/>
-            <pc:sldMk cId="2176850993" sldId="263"/>
-            <ac:grpSpMk id="10" creationId="{2732D3E5-56BD-8E43-ACF5-26B7F41DF83E}"/>
-          </ac:grpSpMkLst>
-        </pc:grpChg>
-        <pc:grpChg chg="add mod">
-          <ac:chgData name="Sinuo Chen" userId="3dace1ba-4a10-4eb3-a791-b35dca6600ed" providerId="ADAL" clId="{8F8D5907-36EA-C14A-9466-85BE394ADC97}" dt="2022-03-18T07:57:05.265" v="454" actId="1076"/>
-          <ac:grpSpMkLst>
-            <pc:docMk/>
-            <pc:sldMk cId="2176850993" sldId="263"/>
-            <ac:grpSpMk id="13" creationId="{80FCF0DE-AF9A-CE41-A0EE-A82ABB0049C1}"/>
-          </ac:grpSpMkLst>
-        </pc:grpChg>
-      </pc:sldChg>
-      <pc:sldChg chg="delSp modSp add mod ord">
-        <pc:chgData name="Sinuo Chen" userId="3dace1ba-4a10-4eb3-a791-b35dca6600ed" providerId="ADAL" clId="{8F8D5907-36EA-C14A-9466-85BE394ADC97}" dt="2022-03-18T08:33:18.182" v="605" actId="14100"/>
-        <pc:sldMkLst>
-          <pc:docMk/>
-          <pc:sldMk cId="2395138828" sldId="264"/>
-        </pc:sldMkLst>
-        <pc:spChg chg="mod">
-          <ac:chgData name="Sinuo Chen" userId="3dace1ba-4a10-4eb3-a791-b35dca6600ed" providerId="ADAL" clId="{8F8D5907-36EA-C14A-9466-85BE394ADC97}" dt="2022-03-18T08:22:43.366" v="478" actId="20577"/>
-          <ac:spMkLst>
-            <pc:docMk/>
-            <pc:sldMk cId="2395138828" sldId="264"/>
-            <ac:spMk id="2" creationId="{00000000-0000-0000-0000-000000000000}"/>
-          </ac:spMkLst>
-        </pc:spChg>
-        <pc:spChg chg="mod">
-          <ac:chgData name="Sinuo Chen" userId="3dace1ba-4a10-4eb3-a791-b35dca6600ed" providerId="ADAL" clId="{8F8D5907-36EA-C14A-9466-85BE394ADC97}" dt="2022-03-18T08:33:18.182" v="605" actId="14100"/>
-          <ac:spMkLst>
-            <pc:docMk/>
-            <pc:sldMk cId="2395138828" sldId="264"/>
-            <ac:spMk id="3" creationId="{B1D40A49-DC3E-374D-A925-F8E5C84A18DC}"/>
-          </ac:spMkLst>
-        </pc:spChg>
-        <pc:picChg chg="del">
-          <ac:chgData name="Sinuo Chen" userId="3dace1ba-4a10-4eb3-a791-b35dca6600ed" providerId="ADAL" clId="{8F8D5907-36EA-C14A-9466-85BE394ADC97}" dt="2022-03-18T08:24:19.630" v="494" actId="478"/>
-          <ac:picMkLst>
-            <pc:docMk/>
-            <pc:sldMk cId="2395138828" sldId="264"/>
-            <ac:picMk id="4" creationId="{645DA7F4-DF09-2E4F-91E2-D4F045CF98BF}"/>
-          </ac:picMkLst>
-        </pc:picChg>
       </pc:sldChg>
     </pc:docChg>
   </pc:docChgLst>
@@ -3275,15 +2564,31 @@
           <a:p>
             <a:pPr marL="971550" lvl="2" indent="-457200"/>
             <a:r>
+              <a:rPr lang="en-US" sz="1900" b="1" i="1" dirty="0">
+                <a:solidFill>
+                  <a:schemeClr val="tx2"/>
+                </a:solidFill>
+              </a:rPr>
+              <a:t>Data &amp; Feature Stability</a:t>
+            </a:r>
+            <a:r>
               <a:rPr lang="en-US" sz="1900" dirty="0"/>
-              <a:t>Feature Stability: helps predict drift properties</a:t>
+              <a:t>: helps predict drift properties</a:t>
             </a:r>
           </a:p>
           <a:p>
             <a:pPr marL="971550" lvl="2" indent="-457200"/>
             <a:r>
+              <a:rPr lang="en-US" sz="1900" b="1" i="1" dirty="0">
+                <a:solidFill>
+                  <a:schemeClr val="tx2"/>
+                </a:solidFill>
+              </a:rPr>
+              <a:t>Feature Recommender</a:t>
+            </a:r>
+            <a:r>
               <a:rPr lang="en-US" sz="1900" dirty="0"/>
-              <a:t>Feature Recommender: addresses the cold start problem in feature composition</a:t>
+              <a:t>: addresses the cold start problem in feature composition</a:t>
             </a:r>
           </a:p>
           <a:p>
@@ -3322,6 +2627,307 @@
   <p:clrMapOvr>
     <a:masterClrMapping/>
   </p:clrMapOvr>
+  <p:timing>
+    <p:tnLst>
+      <p:par>
+        <p:cTn id="1" dur="indefinite" restart="never" nodeType="tmRoot">
+          <p:childTnLst>
+            <p:seq concurrent="1" nextAc="seek">
+              <p:cTn id="2" dur="indefinite" nodeType="mainSeq">
+                <p:childTnLst>
+                  <p:par>
+                    <p:cTn id="3" fill="hold">
+                      <p:stCondLst>
+                        <p:cond delay="indefinite"/>
+                      </p:stCondLst>
+                      <p:childTnLst>
+                        <p:par>
+                          <p:cTn id="4" fill="hold">
+                            <p:stCondLst>
+                              <p:cond delay="0"/>
+                            </p:stCondLst>
+                            <p:childTnLst>
+                              <p:par>
+                                <p:cTn id="5" presetID="1" presetClass="entr" presetSubtype="0" fill="hold" nodeType="clickEffect">
+                                  <p:stCondLst>
+                                    <p:cond delay="0"/>
+                                  </p:stCondLst>
+                                  <p:childTnLst>
+                                    <p:set>
+                                      <p:cBhvr>
+                                        <p:cTn id="6" dur="1" fill="hold">
+                                          <p:stCondLst>
+                                            <p:cond delay="0"/>
+                                          </p:stCondLst>
+                                        </p:cTn>
+                                        <p:tgtEl>
+                                          <p:spTgt spid="3">
+                                            <p:txEl>
+                                              <p:pRg st="0" end="0"/>
+                                            </p:txEl>
+                                          </p:spTgt>
+                                        </p:tgtEl>
+                                        <p:attrNameLst>
+                                          <p:attrName>style.visibility</p:attrName>
+                                        </p:attrNameLst>
+                                      </p:cBhvr>
+                                      <p:to>
+                                        <p:strVal val="visible"/>
+                                      </p:to>
+                                    </p:set>
+                                  </p:childTnLst>
+                                </p:cTn>
+                              </p:par>
+                              <p:par>
+                                <p:cTn id="7" presetID="1" presetClass="entr" presetSubtype="0" fill="hold" nodeType="withEffect">
+                                  <p:stCondLst>
+                                    <p:cond delay="0"/>
+                                  </p:stCondLst>
+                                  <p:childTnLst>
+                                    <p:set>
+                                      <p:cBhvr>
+                                        <p:cTn id="8" dur="1" fill="hold">
+                                          <p:stCondLst>
+                                            <p:cond delay="0"/>
+                                          </p:stCondLst>
+                                        </p:cTn>
+                                        <p:tgtEl>
+                                          <p:spTgt spid="3">
+                                            <p:txEl>
+                                              <p:pRg st="1" end="1"/>
+                                            </p:txEl>
+                                          </p:spTgt>
+                                        </p:tgtEl>
+                                        <p:attrNameLst>
+                                          <p:attrName>style.visibility</p:attrName>
+                                        </p:attrNameLst>
+                                      </p:cBhvr>
+                                      <p:to>
+                                        <p:strVal val="visible"/>
+                                      </p:to>
+                                    </p:set>
+                                  </p:childTnLst>
+                                </p:cTn>
+                              </p:par>
+                            </p:childTnLst>
+                          </p:cTn>
+                        </p:par>
+                      </p:childTnLst>
+                    </p:cTn>
+                  </p:par>
+                  <p:par>
+                    <p:cTn id="9" fill="hold">
+                      <p:stCondLst>
+                        <p:cond delay="indefinite"/>
+                      </p:stCondLst>
+                      <p:childTnLst>
+                        <p:par>
+                          <p:cTn id="10" fill="hold">
+                            <p:stCondLst>
+                              <p:cond delay="0"/>
+                            </p:stCondLst>
+                            <p:childTnLst>
+                              <p:par>
+                                <p:cTn id="11" presetID="1" presetClass="entr" presetSubtype="0" fill="hold" nodeType="clickEffect">
+                                  <p:stCondLst>
+                                    <p:cond delay="0"/>
+                                  </p:stCondLst>
+                                  <p:childTnLst>
+                                    <p:set>
+                                      <p:cBhvr>
+                                        <p:cTn id="12" dur="1" fill="hold">
+                                          <p:stCondLst>
+                                            <p:cond delay="0"/>
+                                          </p:stCondLst>
+                                        </p:cTn>
+                                        <p:tgtEl>
+                                          <p:spTgt spid="3">
+                                            <p:txEl>
+                                              <p:pRg st="3" end="3"/>
+                                            </p:txEl>
+                                          </p:spTgt>
+                                        </p:tgtEl>
+                                        <p:attrNameLst>
+                                          <p:attrName>style.visibility</p:attrName>
+                                        </p:attrNameLst>
+                                      </p:cBhvr>
+                                      <p:to>
+                                        <p:strVal val="visible"/>
+                                      </p:to>
+                                    </p:set>
+                                  </p:childTnLst>
+                                </p:cTn>
+                              </p:par>
+                              <p:par>
+                                <p:cTn id="13" presetID="1" presetClass="entr" presetSubtype="0" fill="hold" nodeType="withEffect">
+                                  <p:stCondLst>
+                                    <p:cond delay="0"/>
+                                  </p:stCondLst>
+                                  <p:childTnLst>
+                                    <p:set>
+                                      <p:cBhvr>
+                                        <p:cTn id="14" dur="1" fill="hold">
+                                          <p:stCondLst>
+                                            <p:cond delay="0"/>
+                                          </p:stCondLst>
+                                        </p:cTn>
+                                        <p:tgtEl>
+                                          <p:spTgt spid="3">
+                                            <p:txEl>
+                                              <p:pRg st="4" end="4"/>
+                                            </p:txEl>
+                                          </p:spTgt>
+                                        </p:tgtEl>
+                                        <p:attrNameLst>
+                                          <p:attrName>style.visibility</p:attrName>
+                                        </p:attrNameLst>
+                                      </p:cBhvr>
+                                      <p:to>
+                                        <p:strVal val="visible"/>
+                                      </p:to>
+                                    </p:set>
+                                  </p:childTnLst>
+                                </p:cTn>
+                              </p:par>
+                              <p:par>
+                                <p:cTn id="15" presetID="1" presetClass="entr" presetSubtype="0" fill="hold" nodeType="withEffect">
+                                  <p:stCondLst>
+                                    <p:cond delay="0"/>
+                                  </p:stCondLst>
+                                  <p:childTnLst>
+                                    <p:set>
+                                      <p:cBhvr>
+                                        <p:cTn id="16" dur="1" fill="hold">
+                                          <p:stCondLst>
+                                            <p:cond delay="0"/>
+                                          </p:stCondLst>
+                                        </p:cTn>
+                                        <p:tgtEl>
+                                          <p:spTgt spid="3">
+                                            <p:txEl>
+                                              <p:pRg st="5" end="5"/>
+                                            </p:txEl>
+                                          </p:spTgt>
+                                        </p:tgtEl>
+                                        <p:attrNameLst>
+                                          <p:attrName>style.visibility</p:attrName>
+                                        </p:attrNameLst>
+                                      </p:cBhvr>
+                                      <p:to>
+                                        <p:strVal val="visible"/>
+                                      </p:to>
+                                    </p:set>
+                                  </p:childTnLst>
+                                </p:cTn>
+                              </p:par>
+                            </p:childTnLst>
+                          </p:cTn>
+                        </p:par>
+                      </p:childTnLst>
+                    </p:cTn>
+                  </p:par>
+                  <p:par>
+                    <p:cTn id="17" fill="hold">
+                      <p:stCondLst>
+                        <p:cond delay="indefinite"/>
+                      </p:stCondLst>
+                      <p:childTnLst>
+                        <p:par>
+                          <p:cTn id="18" fill="hold">
+                            <p:stCondLst>
+                              <p:cond delay="0"/>
+                            </p:stCondLst>
+                            <p:childTnLst>
+                              <p:par>
+                                <p:cTn id="19" presetID="1" presetClass="entr" presetSubtype="0" fill="hold" nodeType="clickEffect">
+                                  <p:stCondLst>
+                                    <p:cond delay="0"/>
+                                  </p:stCondLst>
+                                  <p:childTnLst>
+                                    <p:set>
+                                      <p:cBhvr>
+                                        <p:cTn id="20" dur="1" fill="hold">
+                                          <p:stCondLst>
+                                            <p:cond delay="0"/>
+                                          </p:stCondLst>
+                                        </p:cTn>
+                                        <p:tgtEl>
+                                          <p:spTgt spid="3">
+                                            <p:txEl>
+                                              <p:pRg st="7" end="7"/>
+                                            </p:txEl>
+                                          </p:spTgt>
+                                        </p:tgtEl>
+                                        <p:attrNameLst>
+                                          <p:attrName>style.visibility</p:attrName>
+                                        </p:attrNameLst>
+                                      </p:cBhvr>
+                                      <p:to>
+                                        <p:strVal val="visible"/>
+                                      </p:to>
+                                    </p:set>
+                                  </p:childTnLst>
+                                </p:cTn>
+                              </p:par>
+                              <p:par>
+                                <p:cTn id="21" presetID="1" presetClass="entr" presetSubtype="0" fill="hold" nodeType="withEffect">
+                                  <p:stCondLst>
+                                    <p:cond delay="0"/>
+                                  </p:stCondLst>
+                                  <p:childTnLst>
+                                    <p:set>
+                                      <p:cBhvr>
+                                        <p:cTn id="22" dur="1" fill="hold">
+                                          <p:stCondLst>
+                                            <p:cond delay="0"/>
+                                          </p:stCondLst>
+                                        </p:cTn>
+                                        <p:tgtEl>
+                                          <p:spTgt spid="3">
+                                            <p:txEl>
+                                              <p:pRg st="8" end="8"/>
+                                            </p:txEl>
+                                          </p:spTgt>
+                                        </p:tgtEl>
+                                        <p:attrNameLst>
+                                          <p:attrName>style.visibility</p:attrName>
+                                        </p:attrNameLst>
+                                      </p:cBhvr>
+                                      <p:to>
+                                        <p:strVal val="visible"/>
+                                      </p:to>
+                                    </p:set>
+                                  </p:childTnLst>
+                                </p:cTn>
+                              </p:par>
+                            </p:childTnLst>
+                          </p:cTn>
+                        </p:par>
+                      </p:childTnLst>
+                    </p:cTn>
+                  </p:par>
+                </p:childTnLst>
+              </p:cTn>
+              <p:prevCondLst>
+                <p:cond evt="onPrev" delay="0">
+                  <p:tgtEl>
+                    <p:sldTgt/>
+                  </p:tgtEl>
+                </p:cond>
+              </p:prevCondLst>
+              <p:nextCondLst>
+                <p:cond evt="onNext" delay="0">
+                  <p:tgtEl>
+                    <p:sldTgt/>
+                  </p:tgtEl>
+                </p:cond>
+              </p:nextCondLst>
+            </p:seq>
+          </p:childTnLst>
+        </p:cTn>
+      </p:par>
+    </p:tnLst>
+  </p:timing>
 </p:sld>
 </file>
 
@@ -4041,11 +3647,361 @@
           </a:p>
         </p:txBody>
       </p:sp>
+      <p:sp>
+        <p:nvSpPr>
+          <p:cNvPr id="11" name="Rounded Rectangle 10">
+            <a:extLst>
+              <a:ext uri="{FF2B5EF4-FFF2-40B4-BE49-F238E27FC236}">
+                <a16:creationId xmlns:a16="http://schemas.microsoft.com/office/drawing/2014/main" id="{21A34977-9983-A447-8784-4A130DDEB9F8}"/>
+              </a:ext>
+            </a:extLst>
+          </p:cNvPr>
+          <p:cNvSpPr/>
+          <p:nvPr/>
+        </p:nvSpPr>
+        <p:spPr>
+          <a:xfrm>
+            <a:off x="1674812" y="1295400"/>
+            <a:ext cx="10050669" cy="304800"/>
+          </a:xfrm>
+          <a:prstGeom prst="roundRect">
+            <a:avLst/>
+          </a:prstGeom>
+          <a:noFill/>
+          <a:ln>
+            <a:solidFill>
+              <a:srgbClr val="7030A0"/>
+            </a:solidFill>
+          </a:ln>
+        </p:spPr>
+        <p:style>
+          <a:lnRef idx="2">
+            <a:schemeClr val="accent1">
+              <a:shade val="50000"/>
+            </a:schemeClr>
+          </a:lnRef>
+          <a:fillRef idx="1">
+            <a:schemeClr val="accent1"/>
+          </a:fillRef>
+          <a:effectRef idx="0">
+            <a:schemeClr val="accent1"/>
+          </a:effectRef>
+          <a:fontRef idx="minor">
+            <a:schemeClr val="lt1"/>
+          </a:fontRef>
+        </p:style>
+        <p:txBody>
+          <a:bodyPr rtlCol="0" anchor="ctr"/>
+          <a:lstStyle/>
+          <a:p>
+            <a:pPr algn="ctr"/>
+            <a:endParaRPr lang="en-US">
+              <a:solidFill>
+                <a:srgbClr val="7030A0"/>
+              </a:solidFill>
+            </a:endParaRPr>
+          </a:p>
+        </p:txBody>
+      </p:sp>
     </p:spTree>
   </p:cSld>
   <p:clrMapOvr>
     <a:masterClrMapping/>
   </p:clrMapOvr>
+  <p:timing>
+    <p:tnLst>
+      <p:par>
+        <p:cTn id="1" dur="indefinite" restart="never" nodeType="tmRoot">
+          <p:childTnLst>
+            <p:seq concurrent="1" nextAc="seek">
+              <p:cTn id="2" dur="indefinite" nodeType="mainSeq">
+                <p:childTnLst>
+                  <p:par>
+                    <p:cTn id="3" fill="hold">
+                      <p:stCondLst>
+                        <p:cond delay="indefinite"/>
+                      </p:stCondLst>
+                      <p:childTnLst>
+                        <p:par>
+                          <p:cTn id="4" fill="hold">
+                            <p:stCondLst>
+                              <p:cond delay="0"/>
+                            </p:stCondLst>
+                            <p:childTnLst>
+                              <p:par>
+                                <p:cTn id="5" presetID="1" presetClass="entr" presetSubtype="0" fill="hold" grpId="0" nodeType="clickEffect">
+                                  <p:stCondLst>
+                                    <p:cond delay="0"/>
+                                  </p:stCondLst>
+                                  <p:childTnLst>
+                                    <p:set>
+                                      <p:cBhvr>
+                                        <p:cTn id="6" dur="1" fill="hold">
+                                          <p:stCondLst>
+                                            <p:cond delay="0"/>
+                                          </p:stCondLst>
+                                        </p:cTn>
+                                        <p:tgtEl>
+                                          <p:spTgt spid="9"/>
+                                        </p:tgtEl>
+                                        <p:attrNameLst>
+                                          <p:attrName>style.visibility</p:attrName>
+                                        </p:attrNameLst>
+                                      </p:cBhvr>
+                                      <p:to>
+                                        <p:strVal val="visible"/>
+                                      </p:to>
+                                    </p:set>
+                                  </p:childTnLst>
+                                </p:cTn>
+                              </p:par>
+                              <p:par>
+                                <p:cTn id="7" presetID="1" presetClass="entr" presetSubtype="0" fill="hold" nodeType="withEffect">
+                                  <p:stCondLst>
+                                    <p:cond delay="0"/>
+                                  </p:stCondLst>
+                                  <p:childTnLst>
+                                    <p:set>
+                                      <p:cBhvr>
+                                        <p:cTn id="8" dur="1" fill="hold">
+                                          <p:stCondLst>
+                                            <p:cond delay="0"/>
+                                          </p:stCondLst>
+                                        </p:cTn>
+                                        <p:tgtEl>
+                                          <p:spTgt spid="2">
+                                            <p:txEl>
+                                              <p:pRg st="3" end="3"/>
+                                            </p:txEl>
+                                          </p:spTgt>
+                                        </p:tgtEl>
+                                        <p:attrNameLst>
+                                          <p:attrName>style.visibility</p:attrName>
+                                        </p:attrNameLst>
+                                      </p:cBhvr>
+                                      <p:to>
+                                        <p:strVal val="visible"/>
+                                      </p:to>
+                                    </p:set>
+                                  </p:childTnLst>
+                                </p:cTn>
+                              </p:par>
+                            </p:childTnLst>
+                          </p:cTn>
+                        </p:par>
+                      </p:childTnLst>
+                    </p:cTn>
+                  </p:par>
+                  <p:par>
+                    <p:cTn id="9" fill="hold">
+                      <p:stCondLst>
+                        <p:cond delay="indefinite"/>
+                      </p:stCondLst>
+                      <p:childTnLst>
+                        <p:par>
+                          <p:cTn id="10" fill="hold">
+                            <p:stCondLst>
+                              <p:cond delay="0"/>
+                            </p:stCondLst>
+                            <p:childTnLst>
+                              <p:par>
+                                <p:cTn id="11" presetID="1" presetClass="entr" presetSubtype="0" fill="hold" grpId="0" nodeType="clickEffect">
+                                  <p:stCondLst>
+                                    <p:cond delay="0"/>
+                                  </p:stCondLst>
+                                  <p:childTnLst>
+                                    <p:set>
+                                      <p:cBhvr>
+                                        <p:cTn id="12" dur="1" fill="hold">
+                                          <p:stCondLst>
+                                            <p:cond delay="0"/>
+                                          </p:stCondLst>
+                                        </p:cTn>
+                                        <p:tgtEl>
+                                          <p:spTgt spid="10"/>
+                                        </p:tgtEl>
+                                        <p:attrNameLst>
+                                          <p:attrName>style.visibility</p:attrName>
+                                        </p:attrNameLst>
+                                      </p:cBhvr>
+                                      <p:to>
+                                        <p:strVal val="visible"/>
+                                      </p:to>
+                                    </p:set>
+                                  </p:childTnLst>
+                                </p:cTn>
+                              </p:par>
+                              <p:par>
+                                <p:cTn id="13" presetID="1" presetClass="entr" presetSubtype="0" fill="hold" nodeType="withEffect">
+                                  <p:stCondLst>
+                                    <p:cond delay="0"/>
+                                  </p:stCondLst>
+                                  <p:childTnLst>
+                                    <p:set>
+                                      <p:cBhvr>
+                                        <p:cTn id="14" dur="1" fill="hold">
+                                          <p:stCondLst>
+                                            <p:cond delay="0"/>
+                                          </p:stCondLst>
+                                        </p:cTn>
+                                        <p:tgtEl>
+                                          <p:spTgt spid="2">
+                                            <p:txEl>
+                                              <p:pRg st="4" end="4"/>
+                                            </p:txEl>
+                                          </p:spTgt>
+                                        </p:tgtEl>
+                                        <p:attrNameLst>
+                                          <p:attrName>style.visibility</p:attrName>
+                                        </p:attrNameLst>
+                                      </p:cBhvr>
+                                      <p:to>
+                                        <p:strVal val="visible"/>
+                                      </p:to>
+                                    </p:set>
+                                  </p:childTnLst>
+                                </p:cTn>
+                              </p:par>
+                            </p:childTnLst>
+                          </p:cTn>
+                        </p:par>
+                      </p:childTnLst>
+                    </p:cTn>
+                  </p:par>
+                  <p:par>
+                    <p:cTn id="15" fill="hold">
+                      <p:stCondLst>
+                        <p:cond delay="indefinite"/>
+                      </p:stCondLst>
+                      <p:childTnLst>
+                        <p:par>
+                          <p:cTn id="16" fill="hold">
+                            <p:stCondLst>
+                              <p:cond delay="0"/>
+                            </p:stCondLst>
+                            <p:childTnLst>
+                              <p:par>
+                                <p:cTn id="17" presetID="1" presetClass="entr" presetSubtype="0" fill="hold" grpId="0" nodeType="clickEffect">
+                                  <p:stCondLst>
+                                    <p:cond delay="0"/>
+                                  </p:stCondLst>
+                                  <p:childTnLst>
+                                    <p:set>
+                                      <p:cBhvr>
+                                        <p:cTn id="18" dur="1" fill="hold">
+                                          <p:stCondLst>
+                                            <p:cond delay="0"/>
+                                          </p:stCondLst>
+                                        </p:cTn>
+                                        <p:tgtEl>
+                                          <p:spTgt spid="11"/>
+                                        </p:tgtEl>
+                                        <p:attrNameLst>
+                                          <p:attrName>style.visibility</p:attrName>
+                                        </p:attrNameLst>
+                                      </p:cBhvr>
+                                      <p:to>
+                                        <p:strVal val="visible"/>
+                                      </p:to>
+                                    </p:set>
+                                  </p:childTnLst>
+                                </p:cTn>
+                              </p:par>
+                              <p:par>
+                                <p:cTn id="19" presetID="1" presetClass="entr" presetSubtype="0" fill="hold" nodeType="withEffect">
+                                  <p:stCondLst>
+                                    <p:cond delay="0"/>
+                                  </p:stCondLst>
+                                  <p:childTnLst>
+                                    <p:set>
+                                      <p:cBhvr>
+                                        <p:cTn id="20" dur="1" fill="hold">
+                                          <p:stCondLst>
+                                            <p:cond delay="0"/>
+                                          </p:stCondLst>
+                                        </p:cTn>
+                                        <p:tgtEl>
+                                          <p:spTgt spid="2">
+                                            <p:txEl>
+                                              <p:pRg st="5" end="5"/>
+                                            </p:txEl>
+                                          </p:spTgt>
+                                        </p:tgtEl>
+                                        <p:attrNameLst>
+                                          <p:attrName>style.visibility</p:attrName>
+                                        </p:attrNameLst>
+                                      </p:cBhvr>
+                                      <p:to>
+                                        <p:strVal val="visible"/>
+                                      </p:to>
+                                    </p:set>
+                                  </p:childTnLst>
+                                </p:cTn>
+                              </p:par>
+                              <p:par>
+                                <p:cTn id="21" presetID="1" presetClass="entr" presetSubtype="0" fill="hold" nodeType="withEffect">
+                                  <p:stCondLst>
+                                    <p:cond delay="0"/>
+                                  </p:stCondLst>
+                                  <p:childTnLst>
+                                    <p:set>
+                                      <p:cBhvr>
+                                        <p:cTn id="22" dur="1" fill="hold">
+                                          <p:stCondLst>
+                                            <p:cond delay="0"/>
+                                          </p:stCondLst>
+                                        </p:cTn>
+                                        <p:tgtEl>
+                                          <p:spTgt spid="2">
+                                            <p:txEl>
+                                              <p:pRg st="6" end="6"/>
+                                            </p:txEl>
+                                          </p:spTgt>
+                                        </p:tgtEl>
+                                        <p:attrNameLst>
+                                          <p:attrName>style.visibility</p:attrName>
+                                        </p:attrNameLst>
+                                      </p:cBhvr>
+                                      <p:to>
+                                        <p:strVal val="visible"/>
+                                      </p:to>
+                                    </p:set>
+                                  </p:childTnLst>
+                                </p:cTn>
+                              </p:par>
+                            </p:childTnLst>
+                          </p:cTn>
+                        </p:par>
+                      </p:childTnLst>
+                    </p:cTn>
+                  </p:par>
+                </p:childTnLst>
+              </p:cTn>
+              <p:prevCondLst>
+                <p:cond evt="onPrev" delay="0">
+                  <p:tgtEl>
+                    <p:sldTgt/>
+                  </p:tgtEl>
+                </p:cond>
+              </p:prevCondLst>
+              <p:nextCondLst>
+                <p:cond evt="onNext" delay="0">
+                  <p:tgtEl>
+                    <p:sldTgt/>
+                  </p:tgtEl>
+                </p:cond>
+              </p:nextCondLst>
+            </p:seq>
+          </p:childTnLst>
+        </p:cTn>
+      </p:par>
+    </p:tnLst>
+    <p:bldLst>
+      <p:bldP spid="9" grpId="0" animBg="1"/>
+      <p:bldP spid="10" grpId="0" animBg="1"/>
+      <p:bldP spid="11" grpId="0" animBg="1"/>
+    </p:bldLst>
+  </p:timing>
 </p:sld>
 </file>
 
@@ -4407,7 +4363,7 @@
                   <a:uLnTx/>
                   <a:uFillTx/>
                 </a:rPr>
-                <a:t>Feature Composer</a:t>
+                <a:t>Feature Identification</a:t>
               </a:r>
             </a:p>
           </p:txBody>
@@ -4962,27 +4918,26 @@
                   <a:ea typeface="+mn-ea"/>
                   <a:cs typeface="+mn-cs"/>
                 </a:rPr>
-                <a:t>Correlated Attributes Removal </a:t>
+                <a:t>Correlated Features Removal </a:t>
               </a:r>
             </a:p>
             <a:p>
-              <a:pPr marL="342900" marR="0" lvl="0" indent="-342900" defTabSz="914400" eaLnBrk="1" fontAlgn="auto" latinLnBrk="0" hangingPunct="1">
-                <a:lnSpc>
-                  <a:spcPct val="100000"/>
-                </a:lnSpc>
+              <a:pPr marL="342900" lvl="0" indent="-342900">
                 <a:spcBef>
                   <a:spcPts val="1000"/>
                 </a:spcBef>
-                <a:spcAft>
-                  <a:spcPts val="0"/>
-                </a:spcAft>
-                <a:buClrTx/>
-                <a:buSzTx/>
                 <a:buFont typeface="Arial" panose="020B0604020202020204" pitchFamily="34" charset="0"/>
                 <a:buChar char="•"/>
-                <a:tabLst/>
                 <a:defRPr/>
               </a:pPr>
+              <a:r>
+                <a:rPr lang="en-US" sz="1500" kern="0" dirty="0">
+                  <a:solidFill>
+                    <a:prstClr val="white"/>
+                  </a:solidFill>
+                </a:rPr>
+                <a:t>Features </a:t>
+              </a:r>
               <a:r>
                 <a:rPr kumimoji="0" lang="en-US" sz="1500" b="0" i="0" u="none" strike="noStrike" kern="0" cap="none" spc="0" normalizeH="0" baseline="0" noProof="0" dirty="0">
                   <a:ln>
@@ -4997,7 +4952,7 @@
                   <a:ea typeface="+mn-ea"/>
                   <a:cs typeface="+mn-cs"/>
                 </a:rPr>
-                <a:t>Attributes with Low Importance Removal</a:t>
+                <a:t>with Low Importance Removal</a:t>
               </a:r>
             </a:p>
             <a:p>
@@ -5273,6 +5228,302 @@
   <p:clrMapOvr>
     <a:masterClrMapping/>
   </p:clrMapOvr>
+  <p:timing>
+    <p:tnLst>
+      <p:par>
+        <p:cTn id="1" dur="indefinite" restart="never" nodeType="tmRoot">
+          <p:childTnLst>
+            <p:seq concurrent="1" nextAc="seek">
+              <p:cTn id="2" dur="indefinite" nodeType="mainSeq">
+                <p:childTnLst>
+                  <p:par>
+                    <p:cTn id="3" fill="hold">
+                      <p:stCondLst>
+                        <p:cond delay="indefinite"/>
+                      </p:stCondLst>
+                      <p:childTnLst>
+                        <p:par>
+                          <p:cTn id="4" fill="hold">
+                            <p:stCondLst>
+                              <p:cond delay="0"/>
+                            </p:stCondLst>
+                            <p:childTnLst>
+                              <p:par>
+                                <p:cTn id="5" presetID="1" presetClass="entr" presetSubtype="0" fill="hold" nodeType="clickEffect">
+                                  <p:stCondLst>
+                                    <p:cond delay="0"/>
+                                  </p:stCondLst>
+                                  <p:childTnLst>
+                                    <p:set>
+                                      <p:cBhvr>
+                                        <p:cTn id="6" dur="1" fill="hold">
+                                          <p:stCondLst>
+                                            <p:cond delay="0"/>
+                                          </p:stCondLst>
+                                        </p:cTn>
+                                        <p:tgtEl>
+                                          <p:spTgt spid="4"/>
+                                        </p:tgtEl>
+                                        <p:attrNameLst>
+                                          <p:attrName>style.visibility</p:attrName>
+                                        </p:attrNameLst>
+                                      </p:cBhvr>
+                                      <p:to>
+                                        <p:strVal val="visible"/>
+                                      </p:to>
+                                    </p:set>
+                                  </p:childTnLst>
+                                </p:cTn>
+                              </p:par>
+                            </p:childTnLst>
+                          </p:cTn>
+                        </p:par>
+                      </p:childTnLst>
+                    </p:cTn>
+                  </p:par>
+                  <p:par>
+                    <p:cTn id="7" fill="hold">
+                      <p:stCondLst>
+                        <p:cond delay="indefinite"/>
+                      </p:stCondLst>
+                      <p:childTnLst>
+                        <p:par>
+                          <p:cTn id="8" fill="hold">
+                            <p:stCondLst>
+                              <p:cond delay="0"/>
+                            </p:stCondLst>
+                            <p:childTnLst>
+                              <p:par>
+                                <p:cTn id="9" presetID="1" presetClass="entr" presetSubtype="0" fill="hold" grpId="0" nodeType="clickEffect">
+                                  <p:stCondLst>
+                                    <p:cond delay="0"/>
+                                  </p:stCondLst>
+                                  <p:childTnLst>
+                                    <p:set>
+                                      <p:cBhvr>
+                                        <p:cTn id="10" dur="1" fill="hold">
+                                          <p:stCondLst>
+                                            <p:cond delay="0"/>
+                                          </p:stCondLst>
+                                        </p:cTn>
+                                        <p:tgtEl>
+                                          <p:spTgt spid="16"/>
+                                        </p:tgtEl>
+                                        <p:attrNameLst>
+                                          <p:attrName>style.visibility</p:attrName>
+                                        </p:attrNameLst>
+                                      </p:cBhvr>
+                                      <p:to>
+                                        <p:strVal val="visible"/>
+                                      </p:to>
+                                    </p:set>
+                                  </p:childTnLst>
+                                </p:cTn>
+                              </p:par>
+                            </p:childTnLst>
+                          </p:cTn>
+                        </p:par>
+                      </p:childTnLst>
+                    </p:cTn>
+                  </p:par>
+                  <p:par>
+                    <p:cTn id="11" fill="hold">
+                      <p:stCondLst>
+                        <p:cond delay="indefinite"/>
+                      </p:stCondLst>
+                      <p:childTnLst>
+                        <p:par>
+                          <p:cTn id="12" fill="hold">
+                            <p:stCondLst>
+                              <p:cond delay="0"/>
+                            </p:stCondLst>
+                            <p:childTnLst>
+                              <p:par>
+                                <p:cTn id="13" presetID="1" presetClass="entr" presetSubtype="0" fill="hold" nodeType="clickEffect">
+                                  <p:stCondLst>
+                                    <p:cond delay="0"/>
+                                  </p:stCondLst>
+                                  <p:childTnLst>
+                                    <p:set>
+                                      <p:cBhvr>
+                                        <p:cTn id="14" dur="1" fill="hold">
+                                          <p:stCondLst>
+                                            <p:cond delay="0"/>
+                                          </p:stCondLst>
+                                        </p:cTn>
+                                        <p:tgtEl>
+                                          <p:spTgt spid="7"/>
+                                        </p:tgtEl>
+                                        <p:attrNameLst>
+                                          <p:attrName>style.visibility</p:attrName>
+                                        </p:attrNameLst>
+                                      </p:cBhvr>
+                                      <p:to>
+                                        <p:strVal val="visible"/>
+                                      </p:to>
+                                    </p:set>
+                                  </p:childTnLst>
+                                </p:cTn>
+                              </p:par>
+                            </p:childTnLst>
+                          </p:cTn>
+                        </p:par>
+                      </p:childTnLst>
+                    </p:cTn>
+                  </p:par>
+                  <p:par>
+                    <p:cTn id="15" fill="hold">
+                      <p:stCondLst>
+                        <p:cond delay="indefinite"/>
+                      </p:stCondLst>
+                      <p:childTnLst>
+                        <p:par>
+                          <p:cTn id="16" fill="hold">
+                            <p:stCondLst>
+                              <p:cond delay="0"/>
+                            </p:stCondLst>
+                            <p:childTnLst>
+                              <p:par>
+                                <p:cTn id="17" presetID="1" presetClass="entr" presetSubtype="0" fill="hold" grpId="0" nodeType="clickEffect">
+                                  <p:stCondLst>
+                                    <p:cond delay="0"/>
+                                  </p:stCondLst>
+                                  <p:childTnLst>
+                                    <p:set>
+                                      <p:cBhvr>
+                                        <p:cTn id="18" dur="1" fill="hold">
+                                          <p:stCondLst>
+                                            <p:cond delay="0"/>
+                                          </p:stCondLst>
+                                        </p:cTn>
+                                        <p:tgtEl>
+                                          <p:spTgt spid="17"/>
+                                        </p:tgtEl>
+                                        <p:attrNameLst>
+                                          <p:attrName>style.visibility</p:attrName>
+                                        </p:attrNameLst>
+                                      </p:cBhvr>
+                                      <p:to>
+                                        <p:strVal val="visible"/>
+                                      </p:to>
+                                    </p:set>
+                                  </p:childTnLst>
+                                </p:cTn>
+                              </p:par>
+                              <p:par>
+                                <p:cTn id="19" presetID="1" presetClass="entr" presetSubtype="0" fill="hold" nodeType="withEffect">
+                                  <p:stCondLst>
+                                    <p:cond delay="0"/>
+                                  </p:stCondLst>
+                                  <p:childTnLst>
+                                    <p:set>
+                                      <p:cBhvr>
+                                        <p:cTn id="20" dur="1" fill="hold">
+                                          <p:stCondLst>
+                                            <p:cond delay="0"/>
+                                          </p:stCondLst>
+                                        </p:cTn>
+                                        <p:tgtEl>
+                                          <p:spTgt spid="10"/>
+                                        </p:tgtEl>
+                                        <p:attrNameLst>
+                                          <p:attrName>style.visibility</p:attrName>
+                                        </p:attrNameLst>
+                                      </p:cBhvr>
+                                      <p:to>
+                                        <p:strVal val="visible"/>
+                                      </p:to>
+                                    </p:set>
+                                  </p:childTnLst>
+                                </p:cTn>
+                              </p:par>
+                              <p:par>
+                                <p:cTn id="21" presetID="1" presetClass="entr" presetSubtype="0" fill="hold" grpId="0" nodeType="withEffect">
+                                  <p:stCondLst>
+                                    <p:cond delay="0"/>
+                                  </p:stCondLst>
+                                  <p:childTnLst>
+                                    <p:set>
+                                      <p:cBhvr>
+                                        <p:cTn id="22" dur="1" fill="hold">
+                                          <p:stCondLst>
+                                            <p:cond delay="0"/>
+                                          </p:stCondLst>
+                                        </p:cTn>
+                                        <p:tgtEl>
+                                          <p:spTgt spid="18"/>
+                                        </p:tgtEl>
+                                        <p:attrNameLst>
+                                          <p:attrName>style.visibility</p:attrName>
+                                        </p:attrNameLst>
+                                      </p:cBhvr>
+                                      <p:to>
+                                        <p:strVal val="visible"/>
+                                      </p:to>
+                                    </p:set>
+                                  </p:childTnLst>
+                                </p:cTn>
+                              </p:par>
+                              <p:par>
+                                <p:cTn id="23" presetID="1" presetClass="entr" presetSubtype="0" fill="hold" nodeType="withEffect">
+                                  <p:stCondLst>
+                                    <p:cond delay="0"/>
+                                  </p:stCondLst>
+                                  <p:childTnLst>
+                                    <p:set>
+                                      <p:cBhvr>
+                                        <p:cTn id="24" dur="1" fill="hold">
+                                          <p:stCondLst>
+                                            <p:cond delay="0"/>
+                                          </p:stCondLst>
+                                        </p:cTn>
+                                        <p:tgtEl>
+                                          <p:spTgt spid="13"/>
+                                        </p:tgtEl>
+                                        <p:attrNameLst>
+                                          <p:attrName>style.visibility</p:attrName>
+                                        </p:attrNameLst>
+                                      </p:cBhvr>
+                                      <p:to>
+                                        <p:strVal val="visible"/>
+                                      </p:to>
+                                    </p:set>
+                                  </p:childTnLst>
+                                </p:cTn>
+                              </p:par>
+                            </p:childTnLst>
+                          </p:cTn>
+                        </p:par>
+                      </p:childTnLst>
+                    </p:cTn>
+                  </p:par>
+                </p:childTnLst>
+              </p:cTn>
+              <p:prevCondLst>
+                <p:cond evt="onPrev" delay="0">
+                  <p:tgtEl>
+                    <p:sldTgt/>
+                  </p:tgtEl>
+                </p:cond>
+              </p:prevCondLst>
+              <p:nextCondLst>
+                <p:cond evt="onNext" delay="0">
+                  <p:tgtEl>
+                    <p:sldTgt/>
+                  </p:tgtEl>
+                </p:cond>
+              </p:nextCondLst>
+            </p:seq>
+          </p:childTnLst>
+        </p:cTn>
+      </p:par>
+    </p:tnLst>
+    <p:bldLst>
+      <p:bldP spid="16" grpId="0" animBg="1"/>
+      <p:bldP spid="17" grpId="0" animBg="1"/>
+      <p:bldP spid="18" grpId="0" animBg="1"/>
+    </p:bldLst>
+  </p:timing>
 </p:sld>
 </file>
 
@@ -5508,6 +5759,15 @@
 </file>
 
 <file path=customXml/item2.xml><?xml version="1.0" encoding="utf-8"?>
+<?mso-contentType ?>
+<FormTemplates xmlns="http://schemas.microsoft.com/sharepoint/v3/contenttype/forms">
+  <Display>DocumentLibraryForm</Display>
+  <Edit>DocumentLibraryForm</Edit>
+  <New>DocumentLibraryForm</New>
+</FormTemplates>
+</file>
+
+<file path=customXml/item3.xml><?xml version="1.0" encoding="utf-8"?>
 <ct:contentTypeSchema xmlns:ct="http://schemas.microsoft.com/office/2006/metadata/contentType" xmlns:ma="http://schemas.microsoft.com/office/2006/metadata/properties/metaAttributes" ct:_="" ma:_="" ma:contentTypeName="Document" ma:contentTypeID="0x0101001704DFFABD24F2418DAFC9B95697FDF3" ma:contentTypeVersion="12" ma:contentTypeDescription="Create a new document." ma:contentTypeScope="" ma:versionID="5e3937b3e8b95087abe6601273b5fd78">
   <xsd:schema xmlns:xsd="http://www.w3.org/2001/XMLSchema" xmlns:xs="http://www.w3.org/2001/XMLSchema" xmlns:p="http://schemas.microsoft.com/office/2006/metadata/properties" xmlns:ns2="33818b7f-41cc-44b6-a9db-494870eb7fa7" xmlns:ns3="96efcc39-b2e5-4f7b-aaab-c972485de1d7" targetNamespace="http://schemas.microsoft.com/office/2006/metadata/properties" ma:root="true" ma:fieldsID="10f7383d5142673a4b5f5d7ae5dba193" ns2:_="" ns3:_="">
     <xsd:import namespace="33818b7f-41cc-44b6-a9db-494870eb7fa7"/>
@@ -5724,33 +5984,32 @@
 </ct:contentTypeSchema>
 </file>
 
-<file path=customXml/item3.xml><?xml version="1.0" encoding="utf-8"?>
-<?mso-contentType ?>
-<FormTemplates xmlns="http://schemas.microsoft.com/sharepoint/v3/contenttype/forms">
-  <Display>DocumentLibraryForm</Display>
-  <Edit>DocumentLibraryForm</Edit>
-  <New>DocumentLibraryForm</New>
-</FormTemplates>
-</file>
-
 <file path=customXml/itemProps1.xml><?xml version="1.0" encoding="utf-8"?>
 <ds:datastoreItem xmlns:ds="http://schemas.openxmlformats.org/officeDocument/2006/customXml" ds:itemID="{669553B3-A8C7-4895-AC3F-E12F960FAFA8}">
   <ds:schemaRefs>
+    <ds:schemaRef ds:uri="96efcc39-b2e5-4f7b-aaab-c972485de1d7"/>
+    <ds:schemaRef ds:uri="http://purl.org/dc/terms/"/>
+    <ds:schemaRef ds:uri="http://purl.org/dc/dcmitype/"/>
+    <ds:schemaRef ds:uri="33818b7f-41cc-44b6-a9db-494870eb7fa7"/>
+    <ds:schemaRef ds:uri="http://purl.org/dc/elements/1.1/"/>
+    <ds:schemaRef ds:uri="http://schemas.microsoft.com/office/2006/documentManagement/types"/>
+    <ds:schemaRef ds:uri="http://www.w3.org/XML/1998/namespace"/>
+    <ds:schemaRef ds:uri="http://schemas.microsoft.com/office/infopath/2007/PartnerControls"/>
+    <ds:schemaRef ds:uri="http://schemas.openxmlformats.org/package/2006/metadata/core-properties"/>
     <ds:schemaRef ds:uri="http://schemas.microsoft.com/office/2006/metadata/properties"/>
-    <ds:schemaRef ds:uri="http://schemas.microsoft.com/office/infopath/2007/PartnerControls"/>
-    <ds:schemaRef ds:uri="http://purl.org/dc/dcmitype/"/>
-    <ds:schemaRef ds:uri="http://schemas.openxmlformats.org/package/2006/metadata/core-properties"/>
-    <ds:schemaRef ds:uri="http://purl.org/dc/elements/1.1/"/>
-    <ds:schemaRef ds:uri="http://purl.org/dc/terms/"/>
-    <ds:schemaRef ds:uri="http://schemas.microsoft.com/office/2006/documentManagement/types"/>
-    <ds:schemaRef ds:uri="96efcc39-b2e5-4f7b-aaab-c972485de1d7"/>
-    <ds:schemaRef ds:uri="33818b7f-41cc-44b6-a9db-494870eb7fa7"/>
-    <ds:schemaRef ds:uri="http://www.w3.org/XML/1998/namespace"/>
   </ds:schemaRefs>
 </ds:datastoreItem>
 </file>
 
 <file path=customXml/itemProps2.xml><?xml version="1.0" encoding="utf-8"?>
+<ds:datastoreItem xmlns:ds="http://schemas.openxmlformats.org/officeDocument/2006/customXml" ds:itemID="{D15FAB73-8BEC-4918-A0EA-51399F0070B5}">
+  <ds:schemaRefs>
+    <ds:schemaRef ds:uri="http://schemas.microsoft.com/sharepoint/v3/contenttype/forms"/>
+  </ds:schemaRefs>
+</ds:datastoreItem>
+</file>
+
+<file path=customXml/itemProps3.xml><?xml version="1.0" encoding="utf-8"?>
 <ds:datastoreItem xmlns:ds="http://schemas.openxmlformats.org/officeDocument/2006/customXml" ds:itemID="{3474E60F-3949-4DF9-BBB4-C370DB02D594}">
   <ds:schemaRefs>
     <ds:schemaRef ds:uri="http://schemas.microsoft.com/office/2006/metadata/contentType"/>
@@ -5767,12 +6026,4 @@
     <ds:schemaRef ds:uri="http://schemas.microsoft.com/internal/obd"/>
   </ds:schemaRefs>
 </ds:datastoreItem>
-</file>
-
-<file path=customXml/itemProps3.xml><?xml version="1.0" encoding="utf-8"?>
-<ds:datastoreItem xmlns:ds="http://schemas.openxmlformats.org/officeDocument/2006/customXml" ds:itemID="{D15FAB73-8BEC-4918-A0EA-51399F0070B5}">
-  <ds:schemaRefs>
-    <ds:schemaRef ds:uri="http://schemas.microsoft.com/sharepoint/v3/contenttype/forms"/>
-  </ds:schemaRefs>
-</ds:datastoreItem>
 </file>
</xml_diff>

<commit_message>
Update demo notebook and deck
</commit_message>
<xml_diff>
--- a/tutorial/use_case_demo/assets/Anovos Use Case Presentation.pptx
+++ b/tutorial/use_case_demo/assets/Anovos Use Case Presentation.pptx
@@ -131,8 +131,7 @@
 <file path=ppt/revisionInfo.xml><?xml version="1.0" encoding="utf-8"?>
 <p1510:revInfo xmlns:a="http://schemas.openxmlformats.org/drawingml/2006/main" xmlns:r="http://schemas.openxmlformats.org/officeDocument/2006/relationships" xmlns:p1510="http://schemas.microsoft.com/office/powerpoint/2015/10/main">
   <p1510:revLst>
-    <p1510:client id="{7F9B3CD0-F58F-964A-B0FD-528AAB98ABDF}" v="45" dt="2022-03-21T21:09:54.193"/>
-    <p1510:client id="{814F9AAF-B235-4145-B452-01CCF55E0F8A}" v="1" dt="2022-03-22T09:48:54.561"/>
+    <p1510:client id="{814F9AAF-B235-4145-B452-01CCF55E0F8A}" v="3" dt="2022-03-25T09:19:09.047"/>
   </p1510:revLst>
 </p1510:revInfo>
 </file>
@@ -142,10 +141,17 @@
   <pc:docChgLst>
     <pc:chgData name="Sinuo Chen" userId="3dace1ba-4a10-4eb3-a791-b35dca6600ed" providerId="ADAL" clId="{814F9AAF-B235-4145-B452-01CCF55E0F8A}"/>
     <pc:docChg chg="modSld">
-      <pc:chgData name="Sinuo Chen" userId="3dace1ba-4a10-4eb3-a791-b35dca6600ed" providerId="ADAL" clId="{814F9AAF-B235-4145-B452-01CCF55E0F8A}" dt="2022-03-22T09:48:54.561" v="8"/>
+      <pc:chgData name="Sinuo Chen" userId="3dace1ba-4a10-4eb3-a791-b35dca6600ed" providerId="ADAL" clId="{814F9AAF-B235-4145-B452-01CCF55E0F8A}" dt="2022-03-25T09:19:09.047" v="10"/>
       <pc:docMkLst>
         <pc:docMk/>
       </pc:docMkLst>
+      <pc:sldChg chg="modAnim">
+        <pc:chgData name="Sinuo Chen" userId="3dace1ba-4a10-4eb3-a791-b35dca6600ed" providerId="ADAL" clId="{814F9AAF-B235-4145-B452-01CCF55E0F8A}" dt="2022-03-25T09:19:09.047" v="10"/>
+        <pc:sldMkLst>
+          <pc:docMk/>
+          <pc:sldMk cId="0" sldId="260"/>
+        </pc:sldMkLst>
+      </pc:sldChg>
       <pc:sldChg chg="modSp mod">
         <pc:chgData name="Sinuo Chen" userId="3dace1ba-4a10-4eb3-a791-b35dca6600ed" providerId="ADAL" clId="{814F9AAF-B235-4145-B452-01CCF55E0F8A}" dt="2022-03-22T09:48:54.561" v="8"/>
         <pc:sldMkLst>
@@ -3818,7 +3824,7 @@
                                           </p:stCondLst>
                                         </p:cTn>
                                         <p:tgtEl>
-                                          <p:spTgt spid="10"/>
+                                          <p:spTgt spid="11"/>
                                         </p:tgtEl>
                                         <p:attrNameLst>
                                           <p:attrName>style.visibility</p:attrName>
@@ -3894,7 +3900,7 @@
                                           </p:stCondLst>
                                         </p:cTn>
                                         <p:tgtEl>
-                                          <p:spTgt spid="11"/>
+                                          <p:spTgt spid="10"/>
                                         </p:tgtEl>
                                         <p:attrNameLst>
                                           <p:attrName>style.visibility</p:attrName>
@@ -5753,18 +5759,18 @@
 </file>
 
 <file path=customXml/item1.xml><?xml version="1.0" encoding="utf-8"?>
-<p:properties xmlns:p="http://schemas.microsoft.com/office/2006/metadata/properties" xmlns:xsi="http://www.w3.org/2001/XMLSchema-instance" xmlns:pc="http://schemas.microsoft.com/office/infopath/2007/PartnerControls">
-  <documentManagement/>
-</p:properties>
-</file>
-
-<file path=customXml/item2.xml><?xml version="1.0" encoding="utf-8"?>
 <?mso-contentType ?>
 <FormTemplates xmlns="http://schemas.microsoft.com/sharepoint/v3/contenttype/forms">
   <Display>DocumentLibraryForm</Display>
   <Edit>DocumentLibraryForm</Edit>
   <New>DocumentLibraryForm</New>
 </FormTemplates>
+</file>
+
+<file path=customXml/item2.xml><?xml version="1.0" encoding="utf-8"?>
+<p:properties xmlns:p="http://schemas.microsoft.com/office/2006/metadata/properties" xmlns:xsi="http://www.w3.org/2001/XMLSchema-instance" xmlns:pc="http://schemas.microsoft.com/office/infopath/2007/PartnerControls">
+  <documentManagement/>
+</p:properties>
 </file>
 
 <file path=customXml/item3.xml><?xml version="1.0" encoding="utf-8"?>
@@ -5985,26 +5991,26 @@
 </file>
 
 <file path=customXml/itemProps1.xml><?xml version="1.0" encoding="utf-8"?>
-<ds:datastoreItem xmlns:ds="http://schemas.openxmlformats.org/officeDocument/2006/customXml" ds:itemID="{669553B3-A8C7-4895-AC3F-E12F960FAFA8}">
+<ds:datastoreItem xmlns:ds="http://schemas.openxmlformats.org/officeDocument/2006/customXml" ds:itemID="{D15FAB73-8BEC-4918-A0EA-51399F0070B5}">
   <ds:schemaRefs>
-    <ds:schemaRef ds:uri="96efcc39-b2e5-4f7b-aaab-c972485de1d7"/>
-    <ds:schemaRef ds:uri="http://purl.org/dc/terms/"/>
-    <ds:schemaRef ds:uri="http://purl.org/dc/dcmitype/"/>
-    <ds:schemaRef ds:uri="33818b7f-41cc-44b6-a9db-494870eb7fa7"/>
-    <ds:schemaRef ds:uri="http://purl.org/dc/elements/1.1/"/>
-    <ds:schemaRef ds:uri="http://schemas.microsoft.com/office/2006/documentManagement/types"/>
-    <ds:schemaRef ds:uri="http://www.w3.org/XML/1998/namespace"/>
-    <ds:schemaRef ds:uri="http://schemas.microsoft.com/office/infopath/2007/PartnerControls"/>
-    <ds:schemaRef ds:uri="http://schemas.openxmlformats.org/package/2006/metadata/core-properties"/>
-    <ds:schemaRef ds:uri="http://schemas.microsoft.com/office/2006/metadata/properties"/>
+    <ds:schemaRef ds:uri="http://schemas.microsoft.com/sharepoint/v3/contenttype/forms"/>
   </ds:schemaRefs>
 </ds:datastoreItem>
 </file>
 
 <file path=customXml/itemProps2.xml><?xml version="1.0" encoding="utf-8"?>
-<ds:datastoreItem xmlns:ds="http://schemas.openxmlformats.org/officeDocument/2006/customXml" ds:itemID="{D15FAB73-8BEC-4918-A0EA-51399F0070B5}">
+<ds:datastoreItem xmlns:ds="http://schemas.openxmlformats.org/officeDocument/2006/customXml" ds:itemID="{669553B3-A8C7-4895-AC3F-E12F960FAFA8}">
   <ds:schemaRefs>
-    <ds:schemaRef ds:uri="http://schemas.microsoft.com/sharepoint/v3/contenttype/forms"/>
+    <ds:schemaRef ds:uri="http://purl.org/dc/elements/1.1/"/>
+    <ds:schemaRef ds:uri="http://purl.org/dc/terms/"/>
+    <ds:schemaRef ds:uri="http://schemas.microsoft.com/office/infopath/2007/PartnerControls"/>
+    <ds:schemaRef ds:uri="http://schemas.microsoft.com/office/2006/documentManagement/types"/>
+    <ds:schemaRef ds:uri="http://schemas.microsoft.com/office/2006/metadata/properties"/>
+    <ds:schemaRef ds:uri="http://purl.org/dc/dcmitype/"/>
+    <ds:schemaRef ds:uri="http://www.w3.org/XML/1998/namespace"/>
+    <ds:schemaRef ds:uri="33818b7f-41cc-44b6-a9db-494870eb7fa7"/>
+    <ds:schemaRef ds:uri="http://schemas.openxmlformats.org/package/2006/metadata/core-properties"/>
+    <ds:schemaRef ds:uri="96efcc39-b2e5-4f7b-aaab-c972485de1d7"/>
   </ds:schemaRefs>
 </ds:datastoreItem>
 </file>

</xml_diff>

<commit_message>
Updated Anovos Use Case Presentation
</commit_message>
<xml_diff>
--- a/tutorial/use_case_demo/assets/Anovos Use Case Presentation.pptx
+++ b/tutorial/use_case_demo/assets/Anovos Use Case Presentation.pptx
@@ -11,6 +11,8 @@
     <p:sldId id="258" r:id="rId8"/>
     <p:sldId id="260" r:id="rId9"/>
     <p:sldId id="263" r:id="rId10"/>
+    <p:sldId id="269" r:id="rId11"/>
+    <p:sldId id="270" r:id="rId12"/>
   </p:sldIdLst>
   <p:sldSz cx="12188825" cy="6858000"/>
   <p:notesSz cx="6858000" cy="9144000"/>
@@ -128,50 +130,6 @@
 </p:presentation>
 </file>
 
-<file path=ppt/revisionInfo.xml><?xml version="1.0" encoding="utf-8"?>
-<p1510:revInfo xmlns:a="http://schemas.openxmlformats.org/drawingml/2006/main" xmlns:r="http://schemas.openxmlformats.org/officeDocument/2006/relationships" xmlns:p1510="http://schemas.microsoft.com/office/powerpoint/2015/10/main">
-  <p1510:revLst>
-    <p1510:client id="{814F9AAF-B235-4145-B452-01CCF55E0F8A}" v="3" dt="2022-03-25T09:19:09.047"/>
-  </p1510:revLst>
-</p1510:revInfo>
-</file>
-
-<file path=ppt/changesInfos/changesInfo1.xml><?xml version="1.0" encoding="utf-8"?>
-<pc:chgInfo xmlns:a="http://schemas.openxmlformats.org/drawingml/2006/main" xmlns:r="http://schemas.openxmlformats.org/officeDocument/2006/relationships" xmlns:ac="http://schemas.microsoft.com/office/drawing/2013/main/command" xmlns:pc="http://schemas.microsoft.com/office/powerpoint/2013/main/command">
-  <pc:docChgLst>
-    <pc:chgData name="Sinuo Chen" userId="3dace1ba-4a10-4eb3-a791-b35dca6600ed" providerId="ADAL" clId="{814F9AAF-B235-4145-B452-01CCF55E0F8A}"/>
-    <pc:docChg chg="modSld">
-      <pc:chgData name="Sinuo Chen" userId="3dace1ba-4a10-4eb3-a791-b35dca6600ed" providerId="ADAL" clId="{814F9AAF-B235-4145-B452-01CCF55E0F8A}" dt="2022-03-25T09:19:09.047" v="10"/>
-      <pc:docMkLst>
-        <pc:docMk/>
-      </pc:docMkLst>
-      <pc:sldChg chg="modAnim">
-        <pc:chgData name="Sinuo Chen" userId="3dace1ba-4a10-4eb3-a791-b35dca6600ed" providerId="ADAL" clId="{814F9AAF-B235-4145-B452-01CCF55E0F8A}" dt="2022-03-25T09:19:09.047" v="10"/>
-        <pc:sldMkLst>
-          <pc:docMk/>
-          <pc:sldMk cId="0" sldId="260"/>
-        </pc:sldMkLst>
-      </pc:sldChg>
-      <pc:sldChg chg="modSp mod">
-        <pc:chgData name="Sinuo Chen" userId="3dace1ba-4a10-4eb3-a791-b35dca6600ed" providerId="ADAL" clId="{814F9AAF-B235-4145-B452-01CCF55E0F8A}" dt="2022-03-22T09:48:54.561" v="8"/>
-        <pc:sldMkLst>
-          <pc:docMk/>
-          <pc:sldMk cId="2176850993" sldId="263"/>
-        </pc:sldMkLst>
-        <pc:spChg chg="mod">
-          <ac:chgData name="Sinuo Chen" userId="3dace1ba-4a10-4eb3-a791-b35dca6600ed" providerId="ADAL" clId="{814F9AAF-B235-4145-B452-01CCF55E0F8A}" dt="2022-03-22T09:48:54.561" v="8"/>
-          <ac:spMkLst>
-            <pc:docMk/>
-            <pc:sldMk cId="2176850993" sldId="263"/>
-            <ac:spMk id="15" creationId="{1F5F9613-DF89-014F-89EE-3E8564B026F1}"/>
-          </ac:spMkLst>
-        </pc:spChg>
-      </pc:sldChg>
-    </pc:docChg>
-  </pc:docChgLst>
-</pc:chgInfo>
-</file>
-
 <file path=ppt/slideLayouts/slideLayout1.xml><?xml version="1.0" encoding="utf-8"?>
 <p:sldLayout xmlns:a="http://schemas.openxmlformats.org/drawingml/2006/main" xmlns:r="http://schemas.openxmlformats.org/officeDocument/2006/relationships" xmlns:p="http://schemas.openxmlformats.org/presentationml/2006/main" preserve="1" userDrawn="1">
   <p:cSld name="Title Slide">
@@ -210,7 +168,7 @@
           <a:lstStyle/>
           <a:p>
             <a:r>
-              <a:rPr lang="en-US" dirty="0"/>
+              <a:rPr lang="en-US"/>
               <a:t>Click to edit Master title style</a:t>
             </a:r>
           </a:p>
@@ -355,7 +313,7 @@
           <a:lstStyle/>
           <a:p>
             <a:r>
-              <a:rPr lang="en-US" sz="800" dirty="0">
+              <a:rPr lang="en-US" sz="800">
                 <a:solidFill>
                   <a:schemeClr val="bg1"/>
                 </a:solidFill>
@@ -365,7 +323,7 @@
           </a:p>
           <a:p>
             <a:r>
-              <a:rPr lang="en-US" sz="800" dirty="0">
+              <a:rPr lang="en-US" sz="800">
                 <a:solidFill>
                   <a:schemeClr val="bg1"/>
                 </a:solidFill>
@@ -373,14 +331,14 @@
               <a:t>Maintained by </a:t>
             </a:r>
             <a:r>
-              <a:rPr lang="en-US" sz="800" dirty="0" err="1">
+              <a:rPr lang="en-US" sz="800" err="1">
                 <a:solidFill>
                   <a:schemeClr val="bg1"/>
                 </a:solidFill>
               </a:rPr>
               <a:t>Mobilewalla</a:t>
             </a:r>
-            <a:endParaRPr lang="en-US" sz="800" dirty="0">
+            <a:endParaRPr lang="en-US" sz="800">
               <a:solidFill>
                 <a:schemeClr val="bg1"/>
               </a:solidFill>
@@ -411,7 +369,7 @@
           <a:lstStyle/>
           <a:p>
             <a:r>
-              <a:rPr lang="en-US" sz="600" dirty="0">
+              <a:rPr lang="en-US" sz="600">
                 <a:solidFill>
                   <a:schemeClr val="bg1">
                     <a:lumMod val="50000"/>
@@ -423,7 +381,7 @@
           </a:p>
           <a:p>
             <a:r>
-              <a:rPr lang="en-US" sz="600" dirty="0">
+              <a:rPr lang="en-US" sz="600">
                 <a:solidFill>
                   <a:schemeClr val="bg1">
                     <a:lumMod val="50000"/>
@@ -434,7 +392,7 @@
             </a:r>
           </a:p>
           <a:p>
-            <a:endParaRPr lang="en-US" sz="600" dirty="0">
+            <a:endParaRPr lang="en-US" sz="600">
               <a:solidFill>
                 <a:schemeClr val="bg1">
                   <a:lumMod val="50000"/>
@@ -489,7 +447,7 @@
           <a:lstStyle/>
           <a:p>
             <a:r>
-              <a:rPr lang="en-US" dirty="0"/>
+              <a:rPr lang="en-US"/>
               <a:t>Click to edit Master title style</a:t>
             </a:r>
           </a:p>
@@ -542,7 +500,7 @@
           </a:lstStyle>
           <a:p>
             <a:r>
-              <a:rPr lang="en-US" dirty="0"/>
+              <a:rPr lang="en-US"/>
               <a:t>Click to edit Master title style</a:t>
             </a:r>
           </a:p>
@@ -668,7 +626,7 @@
           <a:lstStyle/>
           <a:p>
             <a:r>
-              <a:rPr lang="en-US" dirty="0"/>
+              <a:rPr lang="en-US"/>
               <a:t>Click to edit Master title style</a:t>
             </a:r>
           </a:p>
@@ -1537,7 +1495,7 @@
           <a:lstStyle/>
           <a:p>
             <a:r>
-              <a:rPr lang="en-US" dirty="0"/>
+              <a:rPr lang="en-US"/>
               <a:t>Click to edit Master title style</a:t>
             </a:r>
           </a:p>
@@ -1670,7 +1628,7 @@
           <a:lstStyle/>
           <a:p>
             <a:r>
-              <a:rPr lang="en-US" dirty="0"/>
+              <a:rPr lang="en-US"/>
               <a:t>Click to edit Master title style</a:t>
             </a:r>
           </a:p>
@@ -1703,35 +1661,35 @@
           <a:p>
             <a:pPr lvl="0"/>
             <a:r>
-              <a:rPr lang="en-US" dirty="0"/>
+              <a:rPr lang="en-US"/>
               <a:t>Click to edit Master text styles</a:t>
             </a:r>
           </a:p>
           <a:p>
             <a:pPr lvl="1"/>
             <a:r>
-              <a:rPr lang="en-US" dirty="0"/>
+              <a:rPr lang="en-US"/>
               <a:t>Second level</a:t>
             </a:r>
           </a:p>
           <a:p>
             <a:pPr lvl="2"/>
             <a:r>
-              <a:rPr lang="en-US" dirty="0"/>
+              <a:rPr lang="en-US"/>
               <a:t>Third level</a:t>
             </a:r>
           </a:p>
           <a:p>
             <a:pPr lvl="3"/>
             <a:r>
-              <a:rPr lang="en-US" dirty="0"/>
+              <a:rPr lang="en-US"/>
               <a:t>Fourth level</a:t>
             </a:r>
           </a:p>
           <a:p>
             <a:pPr lvl="4"/>
             <a:r>
-              <a:rPr lang="en-US" dirty="0"/>
+              <a:rPr lang="en-US"/>
               <a:t>Fifth level</a:t>
             </a:r>
           </a:p>
@@ -1784,7 +1742,7 @@
           <a:lstStyle/>
           <a:p>
             <a:r>
-              <a:rPr lang="en-US" sz="800" dirty="0">
+              <a:rPr lang="en-US" sz="800">
                 <a:solidFill>
                   <a:srgbClr val="141E31"/>
                 </a:solidFill>
@@ -1794,7 +1752,7 @@
           </a:p>
           <a:p>
             <a:r>
-              <a:rPr lang="en-US" sz="800" dirty="0">
+              <a:rPr lang="en-US" sz="800">
                 <a:solidFill>
                   <a:srgbClr val="141E31"/>
                 </a:solidFill>
@@ -1802,14 +1760,14 @@
               <a:t>Maintained by </a:t>
             </a:r>
             <a:r>
-              <a:rPr lang="en-US" sz="800" dirty="0" err="1">
+              <a:rPr lang="en-US" sz="800" err="1">
                 <a:solidFill>
                   <a:srgbClr val="141E31"/>
                 </a:solidFill>
               </a:rPr>
               <a:t>Mobilewalla</a:t>
             </a:r>
-            <a:endParaRPr lang="en-US" sz="800" dirty="0">
+            <a:endParaRPr lang="en-US" sz="800">
               <a:solidFill>
                 <a:srgbClr val="141E31"/>
               </a:solidFill>
@@ -1840,7 +1798,7 @@
           <a:lstStyle/>
           <a:p>
             <a:r>
-              <a:rPr lang="en-US" sz="600" dirty="0">
+              <a:rPr lang="en-US" sz="600">
                 <a:solidFill>
                   <a:schemeClr val="bg1">
                     <a:lumMod val="65000"/>
@@ -1852,7 +1810,7 @@
           </a:p>
           <a:p>
             <a:r>
-              <a:rPr lang="en-US" sz="600" dirty="0">
+              <a:rPr lang="en-US" sz="600">
                 <a:solidFill>
                   <a:schemeClr val="bg1">
                     <a:lumMod val="65000"/>
@@ -2168,14 +2126,14 @@
           <a:lstStyle/>
           <a:p>
             <a:r>
-              <a:rPr lang="en-US" dirty="0" err="1"/>
+              <a:rPr lang="en-US" err="1"/>
               <a:t>Anovos</a:t>
             </a:r>
             <a:r>
-              <a:rPr lang="en-US" dirty="0"/>
+              <a:rPr lang="en-US"/>
               <a:t> Use Case Demo</a:t>
             </a:r>
-            <a:endParaRPr lang="en-US" dirty="0">
+            <a:endParaRPr lang="en-US">
               <a:solidFill>
                 <a:srgbClr val="E616D3"/>
               </a:solidFill>
@@ -2207,8 +2165,8 @@
               <a:buNone/>
             </a:pPr>
             <a:r>
-              <a:rPr lang="en-US" dirty="0"/>
-              <a:t>Credit Risk Modelling </a:t>
+              <a:rPr lang="en-US"/>
+              <a:t>Credit Risk Modeling </a:t>
             </a:r>
           </a:p>
         </p:txBody>
@@ -2261,14 +2219,14 @@
           <a:lstStyle/>
           <a:p>
             <a:r>
-              <a:rPr lang="en-US" sz="3500" dirty="0" err="1"/>
+              <a:rPr lang="en-US" sz="3500" err="1"/>
               <a:t>Anovos</a:t>
             </a:r>
             <a:br>
-              <a:rPr lang="en-US" sz="3000" dirty="0"/>
+              <a:rPr lang="en-US" sz="3000"/>
             </a:br>
             <a:r>
-              <a:rPr lang="en-US" sz="2500" dirty="0">
+              <a:rPr lang="en-US" sz="2500">
                 <a:solidFill>
                   <a:srgbClr val="5B95EF"/>
                 </a:solidFill>
@@ -2365,14 +2323,14 @@
           <a:lstStyle/>
           <a:p>
             <a:r>
-              <a:rPr lang="en-US" dirty="0"/>
+              <a:rPr lang="en-US"/>
               <a:t>Goal of </a:t>
             </a:r>
             <a:r>
-              <a:rPr lang="en-US" dirty="0" err="1"/>
+              <a:rPr lang="en-US" err="1"/>
               <a:t>Anovos</a:t>
             </a:r>
-            <a:endParaRPr lang="en-US" dirty="0"/>
+            <a:endParaRPr lang="en-US"/>
           </a:p>
         </p:txBody>
       </p:sp>
@@ -2543,34 +2501,34 @@
               <a:buNone/>
             </a:pPr>
             <a:r>
-              <a:rPr lang="en-US" sz="2300" b="1" dirty="0"/>
+              <a:rPr lang="en-US" sz="2300" b="1"/>
               <a:t>To implement a systematic feature engineering process</a:t>
             </a:r>
           </a:p>
           <a:p>
             <a:pPr marL="971550" lvl="2" indent="-457200"/>
             <a:r>
-              <a:rPr lang="en-US" sz="1900" dirty="0"/>
+              <a:rPr lang="en-US" sz="1900"/>
               <a:t>A majority of steps in feature engineering are ad hoc and trial-and-error based, making the output at each step vulnerable to error.</a:t>
             </a:r>
           </a:p>
           <a:p>
             <a:pPr marL="971550" lvl="2" indent="-457200"/>
-            <a:endParaRPr lang="en-US" sz="1900" dirty="0"/>
+            <a:endParaRPr lang="en-US" sz="1900"/>
           </a:p>
           <a:p>
             <a:pPr marL="114300" lvl="1" indent="0">
               <a:buNone/>
             </a:pPr>
             <a:r>
-              <a:rPr lang="en-US" sz="2300" b="1" dirty="0"/>
+              <a:rPr lang="en-US" sz="2300" b="1"/>
               <a:t>To add entirely new capabilities for data scientists</a:t>
             </a:r>
           </a:p>
           <a:p>
             <a:pPr marL="971550" lvl="2" indent="-457200"/>
             <a:r>
-              <a:rPr lang="en-US" sz="1900" b="1" i="1" dirty="0">
+              <a:rPr lang="en-US" sz="1900" b="1" i="1">
                 <a:solidFill>
                   <a:schemeClr val="tx2"/>
                 </a:solidFill>
@@ -2578,14 +2536,14 @@
               <a:t>Data &amp; Feature Stability</a:t>
             </a:r>
             <a:r>
-              <a:rPr lang="en-US" sz="1900" dirty="0"/>
+              <a:rPr lang="en-US" sz="1900"/>
               <a:t>: helps predict drift properties</a:t>
             </a:r>
           </a:p>
           <a:p>
             <a:pPr marL="971550" lvl="2" indent="-457200"/>
             <a:r>
-              <a:rPr lang="en-US" sz="1900" b="1" i="1" dirty="0">
+              <a:rPr lang="en-US" sz="1900" b="1" i="1">
                 <a:solidFill>
                   <a:schemeClr val="tx2"/>
                 </a:solidFill>
@@ -2593,31 +2551,31 @@
               <a:t>Feature Recommender</a:t>
             </a:r>
             <a:r>
-              <a:rPr lang="en-US" sz="1900" dirty="0"/>
+              <a:rPr lang="en-US" sz="1900"/>
               <a:t>: addresses the cold start problem in feature composition</a:t>
             </a:r>
           </a:p>
           <a:p>
             <a:pPr marL="971550" lvl="2" indent="-457200"/>
-            <a:endParaRPr lang="en-US" sz="1900" dirty="0"/>
+            <a:endParaRPr lang="en-US" sz="1900"/>
           </a:p>
           <a:p>
             <a:pPr marL="114300" lvl="1" indent="0">
               <a:buNone/>
             </a:pPr>
             <a:r>
-              <a:rPr lang="en-US" sz="2300" b="1" dirty="0"/>
+              <a:rPr lang="en-US" sz="2300" b="1"/>
               <a:t>To enable scalable feature engineering</a:t>
             </a:r>
           </a:p>
           <a:p>
             <a:pPr marL="971550" lvl="2" indent="-457200"/>
             <a:r>
-              <a:rPr lang="en-US" sz="1900" dirty="0" err="1"/>
+              <a:rPr lang="en-US" sz="1900" err="1"/>
               <a:t>Anovos</a:t>
             </a:r>
             <a:r>
-              <a:rPr lang="en-US" sz="1900" dirty="0"/>
+              <a:rPr lang="en-US" sz="1900"/>
               <a:t> is built on top of the Spark distributed framework to support scale</a:t>
             </a:r>
           </a:p>
@@ -2980,7 +2938,6 @@
               <a:rPr lang="en-US"/>
               <a:t>Demo Introduction</a:t>
             </a:r>
-            <a:endParaRPr lang="en-US" dirty="0"/>
           </a:p>
         </p:txBody>
       </p:sp>
@@ -3157,7 +3114,7 @@
             </a:r>
             <a:r>
               <a:rPr lang="en-US" sz="2300" dirty="0"/>
-              <a:t>: credit risk modelling</a:t>
+              <a:t>: credit risk modeling</a:t>
             </a:r>
           </a:p>
           <a:p>
@@ -3239,6 +3196,49 @@
           </a:prstGeom>
         </p:spPr>
       </p:pic>
+      <p:sp>
+        <p:nvSpPr>
+          <p:cNvPr id="5" name="TextBox 4">
+            <a:extLst>
+              <a:ext uri="{FF2B5EF4-FFF2-40B4-BE49-F238E27FC236}">
+                <a16:creationId xmlns:a16="http://schemas.microsoft.com/office/drawing/2014/main" id="{C29E977B-3CB7-D545-9804-641FF6D5BD42}"/>
+              </a:ext>
+            </a:extLst>
+          </p:cNvPr>
+          <p:cNvSpPr txBox="1"/>
+          <p:nvPr/>
+        </p:nvSpPr>
+        <p:spPr>
+          <a:xfrm>
+            <a:off x="5256212" y="5912533"/>
+            <a:ext cx="6173485" cy="369332"/>
+          </a:xfrm>
+          <a:prstGeom prst="rect">
+            <a:avLst/>
+          </a:prstGeom>
+          <a:noFill/>
+        </p:spPr>
+        <p:txBody>
+          <a:bodyPr wrap="none" rtlCol="0">
+            <a:spAutoFit/>
+          </a:bodyPr>
+          <a:lstStyle/>
+          <a:p>
+            <a:r>
+              <a:rPr lang="en-US" dirty="0"/>
+              <a:t>https://</a:t>
+            </a:r>
+            <a:r>
+              <a:rPr lang="en-US" dirty="0" err="1"/>
+              <a:t>www.kaggle.com</a:t>
+            </a:r>
+            <a:r>
+              <a:rPr lang="en-US" dirty="0"/>
+              <a:t>/c/home-credit-default-risk</a:t>
+            </a:r>
+          </a:p>
+        </p:txBody>
+      </p:sp>
     </p:spTree>
   </p:cSld>
   <p:clrMapOvr>
@@ -3380,14 +3380,14 @@
           <a:lstStyle/>
           <a:p>
             <a:r>
-              <a:rPr lang="en-US" dirty="0"/>
+              <a:rPr lang="en-US"/>
               <a:t>Dataset</a:t>
             </a:r>
             <a:br>
-              <a:rPr lang="en-US" dirty="0"/>
+              <a:rPr lang="en-US"/>
             </a:br>
             <a:r>
-              <a:rPr lang="en-US" sz="2200" dirty="0" err="1">
+              <a:rPr lang="en-US" sz="2200" err="1">
                 <a:solidFill>
                   <a:srgbClr val="5B95EF"/>
                 </a:solidFill>
@@ -3397,7 +3397,7 @@
               </a:rPr>
               <a:t>application_train.csv</a:t>
             </a:r>
-            <a:endParaRPr lang="en-US" sz="2200" dirty="0">
+            <a:endParaRPr lang="en-US" sz="2200">
               <a:solidFill>
                 <a:srgbClr val="5B95EF"/>
               </a:solidFill>
@@ -3811,7 +3811,7 @@
                             </p:stCondLst>
                             <p:childTnLst>
                               <p:par>
-                                <p:cTn id="11" presetID="1" presetClass="entr" presetSubtype="0" fill="hold" grpId="0" nodeType="clickEffect">
+                                <p:cTn id="11" presetID="1" presetClass="entr" presetSubtype="0" fill="hold" nodeType="clickEffect">
                                   <p:stCondLst>
                                     <p:cond delay="0"/>
                                   </p:stCondLst>
@@ -3824,7 +3824,11 @@
                                           </p:stCondLst>
                                         </p:cTn>
                                         <p:tgtEl>
-                                          <p:spTgt spid="11"/>
+                                          <p:spTgt spid="2">
+                                            <p:txEl>
+                                              <p:pRg st="4" end="4"/>
+                                            </p:txEl>
+                                          </p:spTgt>
                                         </p:tgtEl>
                                         <p:attrNameLst>
                                           <p:attrName>style.visibility</p:attrName>
@@ -3838,7 +3842,7 @@
                                 </p:cTn>
                               </p:par>
                               <p:par>
-                                <p:cTn id="13" presetID="1" presetClass="entr" presetSubtype="0" fill="hold" nodeType="withEffect">
+                                <p:cTn id="13" presetID="1" presetClass="entr" presetSubtype="0" fill="hold" grpId="0" nodeType="withEffect">
                                   <p:stCondLst>
                                     <p:cond delay="0"/>
                                   </p:stCondLst>
@@ -3851,11 +3855,7 @@
                                           </p:stCondLst>
                                         </p:cTn>
                                         <p:tgtEl>
-                                          <p:spTgt spid="2">
-                                            <p:txEl>
-                                              <p:pRg st="4" end="4"/>
-                                            </p:txEl>
-                                          </p:spTgt>
+                                          <p:spTgt spid="11"/>
                                         </p:tgtEl>
                                         <p:attrNameLst>
                                           <p:attrName>style.visibility</p:attrName>
@@ -4057,10 +4057,10 @@
           <a:lstStyle/>
           <a:p>
             <a:r>
-              <a:rPr lang="en-US" dirty="0"/>
+              <a:rPr lang="en-US"/>
               <a:t>Demo Workflow</a:t>
             </a:r>
-            <a:endParaRPr lang="en-US" sz="2200" dirty="0">
+            <a:endParaRPr lang="en-US" sz="2200">
               <a:solidFill>
                 <a:srgbClr val="5B95EF"/>
               </a:solidFill>
@@ -4112,7 +4112,7 @@
               <a:avLst/>
             </a:prstGeom>
             <a:solidFill>
-              <a:srgbClr val="F78F1E">
+              <a:srgbClr val="00B0F0">
                 <a:alpha val="78039"/>
               </a:srgbClr>
             </a:solidFill>
@@ -4144,7 +4144,7 @@
                 <a:defRPr/>
               </a:pPr>
               <a:r>
-                <a:rPr kumimoji="0" lang="en-US" sz="1500" b="0" i="0" u="none" strike="noStrike" kern="0" cap="none" spc="0" normalizeH="0" baseline="0" noProof="0" dirty="0">
+                <a:rPr kumimoji="0" lang="en-US" sz="1500" b="0" i="0" u="none" strike="noStrike" kern="0" cap="none" spc="0" normalizeH="0" baseline="0" noProof="0">
                   <a:ln>
                     <a:noFill/>
                   </a:ln>
@@ -4160,7 +4160,7 @@
                 <a:t>Using </a:t>
               </a:r>
               <a:r>
-                <a:rPr kumimoji="0" lang="en-US" sz="1500" b="0" i="0" u="none" strike="noStrike" kern="0" cap="none" spc="0" normalizeH="0" baseline="0" noProof="0" dirty="0" err="1">
+                <a:rPr kumimoji="0" lang="en-US" sz="1500" b="0" i="0" u="none" strike="noStrike" kern="0" cap="none" spc="0" normalizeH="0" baseline="0" noProof="0" err="1">
                   <a:ln>
                     <a:noFill/>
                   </a:ln>
@@ -4176,7 +4176,7 @@
                 <a:t>Anovos</a:t>
               </a:r>
               <a:r>
-                <a:rPr kumimoji="0" lang="en-US" sz="1500" b="0" i="0" u="none" strike="noStrike" kern="0" cap="none" spc="0" normalizeH="0" baseline="0" noProof="0" dirty="0">
+                <a:rPr kumimoji="0" lang="en-US" sz="1500" b="0" i="0" u="none" strike="noStrike" kern="0" cap="none" spc="0" normalizeH="0" baseline="0" noProof="0">
                   <a:ln>
                     <a:noFill/>
                   </a:ln>
@@ -4211,7 +4211,7 @@
                 <a:defRPr/>
               </a:pPr>
               <a:r>
-                <a:rPr kumimoji="0" lang="en-US" sz="1500" b="0" i="0" u="none" strike="noStrike" kern="0" cap="none" spc="0" normalizeH="0" baseline="0" noProof="0" dirty="0">
+                <a:rPr kumimoji="0" lang="en-US" sz="1500" b="0" i="0" u="none" strike="noStrike" kern="0" cap="none" spc="0" normalizeH="0" baseline="0" noProof="0">
                   <a:ln>
                     <a:noFill/>
                   </a:ln>
@@ -4275,7 +4275,7 @@
                 <a:defRPr/>
               </a:pPr>
               <a:r>
-                <a:rPr kumimoji="0" lang="en-US" sz="2000" b="1" i="0" u="none" strike="noStrike" kern="0" cap="none" spc="0" normalizeH="0" baseline="0" noProof="0" dirty="0">
+                <a:rPr kumimoji="0" lang="en-US" sz="2000" b="1" i="0" u="none" strike="noStrike" kern="0" cap="none" spc="0" normalizeH="0" baseline="0" noProof="0">
                   <a:ln>
                     <a:noFill/>
                   </a:ln>
@@ -4358,7 +4358,7 @@
                 <a:defRPr/>
               </a:pPr>
               <a:r>
-                <a:rPr kumimoji="0" lang="en-US" sz="2000" b="1" i="0" u="none" strike="noStrike" kern="0" cap="none" spc="0" normalizeH="0" baseline="0" noProof="0" dirty="0">
+                <a:rPr kumimoji="0" lang="en-US" sz="2000" b="1" i="0" u="none" strike="noStrike" kern="0" cap="none" spc="0" normalizeH="0" baseline="0" noProof="0">
                   <a:ln>
                     <a:noFill/>
                   </a:ln>
@@ -4395,9 +4395,10 @@
               <a:avLst/>
             </a:prstGeom>
             <a:solidFill>
-              <a:srgbClr val="AD6362">
+              <a:schemeClr val="bg1">
+                <a:lumMod val="50000"/>
                 <a:alpha val="72941"/>
-              </a:srgbClr>
+              </a:schemeClr>
             </a:solidFill>
             <a:ln w="25400" cap="flat" cmpd="sng" algn="ctr">
               <a:noFill/>
@@ -4427,7 +4428,7 @@
                 <a:defRPr/>
               </a:pPr>
               <a:r>
-                <a:rPr kumimoji="0" lang="en-US" sz="1500" b="0" i="0" u="none" strike="noStrike" kern="0" cap="none" spc="0" normalizeH="0" baseline="0" noProof="0" dirty="0">
+                <a:rPr kumimoji="0" lang="en-US" sz="1500" b="0" i="0" u="none" strike="noStrike" kern="0" cap="none" spc="0" normalizeH="0" baseline="0" noProof="0">
                   <a:ln>
                     <a:noFill/>
                   </a:ln>
@@ -4462,7 +4463,7 @@
                 <a:defRPr/>
               </a:pPr>
               <a:r>
-                <a:rPr kumimoji="0" lang="en-US" sz="1500" b="0" i="0" u="none" strike="noStrike" kern="0" cap="none" spc="0" normalizeH="0" baseline="0" noProof="0" dirty="0">
+                <a:rPr kumimoji="0" lang="en-US" sz="1500" b="0" i="0" u="none" strike="noStrike" kern="0" cap="none" spc="0" normalizeH="0" baseline="0" noProof="0">
                   <a:ln>
                     <a:noFill/>
                   </a:ln>
@@ -4497,7 +4498,7 @@
                 <a:defRPr/>
               </a:pPr>
               <a:r>
-                <a:rPr kumimoji="0" lang="en-US" sz="1500" b="0" i="0" u="none" strike="noStrike" kern="0" cap="none" spc="0" normalizeH="0" baseline="0" noProof="0" dirty="0">
+                <a:rPr kumimoji="0" lang="en-US" sz="1500" b="0" i="0" u="none" strike="noStrike" kern="0" cap="none" spc="0" normalizeH="0" baseline="0" noProof="0">
                   <a:ln>
                     <a:noFill/>
                   </a:ln>
@@ -4582,7 +4583,7 @@
                 <a:defRPr/>
               </a:pPr>
               <a:r>
-                <a:rPr kumimoji="0" lang="en-US" sz="2000" b="1" i="0" u="none" strike="noStrike" kern="0" cap="none" spc="0" normalizeH="0" baseline="0" noProof="0" dirty="0">
+                <a:rPr kumimoji="0" lang="en-US" sz="2000" b="1" i="0" u="none" strike="noStrike" kern="0" cap="none" spc="0" normalizeH="0" baseline="0" noProof="0">
                   <a:ln>
                     <a:noFill/>
                   </a:ln>
@@ -4619,8 +4620,7 @@
               <a:avLst/>
             </a:prstGeom>
             <a:solidFill>
-              <a:srgbClr val="9BBB59">
-                <a:lumMod val="75000"/>
+              <a:srgbClr val="7030A0">
                 <a:alpha val="76078"/>
               </a:srgbClr>
             </a:solidFill>
@@ -4652,7 +4652,7 @@
                 <a:defRPr/>
               </a:pPr>
               <a:r>
-                <a:rPr kumimoji="0" lang="en-US" sz="1500" b="0" i="0" u="none" strike="noStrike" kern="0" cap="none" spc="0" normalizeH="0" baseline="0" noProof="0" dirty="0">
+                <a:rPr kumimoji="0" lang="en-US" sz="1500" b="0" i="0" u="none" strike="noStrike" kern="0" cap="none" spc="0" normalizeH="0" baseline="0" noProof="0">
                   <a:ln>
                     <a:noFill/>
                   </a:ln>
@@ -4687,7 +4687,7 @@
                 <a:defRPr/>
               </a:pPr>
               <a:r>
-                <a:rPr kumimoji="0" lang="en-US" sz="1500" b="0" i="0" u="none" strike="noStrike" kern="0" cap="none" spc="0" normalizeH="0" baseline="0" noProof="0" dirty="0">
+                <a:rPr kumimoji="0" lang="en-US" sz="1500" b="0" i="0" u="none" strike="noStrike" kern="0" cap="none" spc="0" normalizeH="0" baseline="0" noProof="0">
                   <a:ln>
                     <a:noFill/>
                   </a:ln>
@@ -4722,7 +4722,7 @@
                 <a:defRPr/>
               </a:pPr>
               <a:r>
-                <a:rPr kumimoji="0" lang="en-US" sz="1500" b="0" i="0" u="none" strike="noStrike" kern="0" cap="none" spc="0" normalizeH="0" baseline="0" noProof="0" dirty="0">
+                <a:rPr kumimoji="0" lang="en-US" sz="1500" b="0" i="0" u="none" strike="noStrike" kern="0" cap="none" spc="0" normalizeH="0" baseline="0" noProof="0">
                   <a:ln>
                     <a:noFill/>
                   </a:ln>
@@ -4757,7 +4757,7 @@
                 <a:defRPr/>
               </a:pPr>
               <a:r>
-                <a:rPr kumimoji="0" lang="en-US" sz="1500" b="0" i="0" u="none" strike="noStrike" kern="0" cap="none" spc="0" normalizeH="0" baseline="0" noProof="0" dirty="0">
+                <a:rPr kumimoji="0" lang="en-US" sz="1500" b="0" i="0" u="none" strike="noStrike" kern="0" cap="none" spc="0" normalizeH="0" baseline="0" noProof="0">
                   <a:ln>
                     <a:noFill/>
                   </a:ln>
@@ -4842,7 +4842,7 @@
                 <a:defRPr/>
               </a:pPr>
               <a:r>
-                <a:rPr kumimoji="0" lang="en-US" sz="2000" b="1" i="0" u="none" strike="noStrike" kern="0" cap="none" spc="0" normalizeH="0" baseline="0" noProof="0" dirty="0">
+                <a:rPr kumimoji="0" lang="en-US" sz="2000" b="1" i="0" u="none" strike="noStrike" kern="0" cap="none" spc="0" normalizeH="0" baseline="0" noProof="0">
                   <a:ln>
                     <a:noFill/>
                   </a:ln>
@@ -4879,7 +4879,7 @@
               <a:avLst/>
             </a:prstGeom>
             <a:solidFill>
-              <a:srgbClr val="6D8BB0">
+              <a:srgbClr val="E616D3">
                 <a:alpha val="72941"/>
               </a:srgbClr>
             </a:solidFill>
@@ -4911,7 +4911,7 @@
                 <a:defRPr/>
               </a:pPr>
               <a:r>
-                <a:rPr kumimoji="0" lang="en-US" sz="1500" b="0" i="0" u="none" strike="noStrike" kern="0" cap="none" spc="0" normalizeH="0" baseline="0" noProof="0" dirty="0">
+                <a:rPr kumimoji="0" lang="en-US" sz="1500" b="0" i="0" u="none" strike="noStrike" kern="0" cap="none" spc="0" normalizeH="0" baseline="0" noProof="0">
                   <a:ln>
                     <a:noFill/>
                   </a:ln>
@@ -4924,41 +4924,7 @@
                   <a:ea typeface="+mn-ea"/>
                   <a:cs typeface="+mn-cs"/>
                 </a:rPr>
-                <a:t>Correlated Features Removal </a:t>
-              </a:r>
-            </a:p>
-            <a:p>
-              <a:pPr marL="342900" lvl="0" indent="-342900">
-                <a:spcBef>
-                  <a:spcPts val="1000"/>
-                </a:spcBef>
-                <a:buFont typeface="Arial" panose="020B0604020202020204" pitchFamily="34" charset="0"/>
-                <a:buChar char="•"/>
-                <a:defRPr/>
-              </a:pPr>
-              <a:r>
-                <a:rPr lang="en-US" sz="1500" kern="0" dirty="0">
-                  <a:solidFill>
-                    <a:prstClr val="white"/>
-                  </a:solidFill>
-                </a:rPr>
-                <a:t>Features </a:t>
-              </a:r>
-              <a:r>
-                <a:rPr kumimoji="0" lang="en-US" sz="1500" b="0" i="0" u="none" strike="noStrike" kern="0" cap="none" spc="0" normalizeH="0" baseline="0" noProof="0" dirty="0">
-                  <a:ln>
-                    <a:noFill/>
-                  </a:ln>
-                  <a:solidFill>
-                    <a:prstClr val="white"/>
-                  </a:solidFill>
-                  <a:effectLst/>
-                  <a:uLnTx/>
-                  <a:uFillTx/>
-                  <a:ea typeface="+mn-ea"/>
-                  <a:cs typeface="+mn-cs"/>
-                </a:rPr>
-                <a:t>with Low Importance Removal</a:t>
+                <a:t>Correlated Attributes Removal </a:t>
               </a:r>
             </a:p>
             <a:p>
@@ -4980,7 +4946,42 @@
                 <a:defRPr/>
               </a:pPr>
               <a:r>
-                <a:rPr kumimoji="0" lang="en-US" sz="1500" b="0" i="0" u="none" strike="noStrike" kern="0" cap="none" spc="0" normalizeH="0" baseline="0" noProof="0" dirty="0">
+                <a:rPr kumimoji="0" lang="en-US" sz="1500" b="0" i="0" u="none" strike="noStrike" kern="0" cap="none" spc="0" normalizeH="0" baseline="0" noProof="0">
+                  <a:ln>
+                    <a:noFill/>
+                  </a:ln>
+                  <a:solidFill>
+                    <a:prstClr val="white"/>
+                  </a:solidFill>
+                  <a:effectLst/>
+                  <a:uLnTx/>
+                  <a:uFillTx/>
+                  <a:ea typeface="+mn-ea"/>
+                  <a:cs typeface="+mn-cs"/>
+                </a:rPr>
+                <a:t>Attributes with Low Importance Removal</a:t>
+              </a:r>
+            </a:p>
+            <a:p>
+              <a:pPr marL="342900" marR="0" lvl="0" indent="-342900" defTabSz="914400" eaLnBrk="1" fontAlgn="auto" latinLnBrk="0" hangingPunct="1">
+                <a:lnSpc>
+                  <a:spcPct val="100000"/>
+                </a:lnSpc>
+                <a:spcBef>
+                  <a:spcPts val="1000"/>
+                </a:spcBef>
+                <a:spcAft>
+                  <a:spcPts val="0"/>
+                </a:spcAft>
+                <a:buClrTx/>
+                <a:buSzTx/>
+                <a:buFont typeface="Arial" panose="020B0604020202020204" pitchFamily="34" charset="0"/>
+                <a:buChar char="•"/>
+                <a:tabLst/>
+                <a:defRPr/>
+              </a:pPr>
+              <a:r>
+                <a:rPr kumimoji="0" lang="en-US" sz="1500" b="0" i="0" u="none" strike="noStrike" kern="0" cap="none" spc="0" normalizeH="0" baseline="0" noProof="0">
                   <a:ln>
                     <a:noFill/>
                   </a:ln>
@@ -5530,6 +5531,752 @@
       <p:bldP spid="18" grpId="0" animBg="1"/>
     </p:bldLst>
   </p:timing>
+</p:sld>
+</file>
+
+<file path=ppt/slides/slide7.xml><?xml version="1.0" encoding="utf-8"?>
+<p:sld xmlns:a="http://schemas.openxmlformats.org/drawingml/2006/main" xmlns:r="http://schemas.openxmlformats.org/officeDocument/2006/relationships" xmlns:p="http://schemas.openxmlformats.org/presentationml/2006/main">
+  <p:cSld>
+    <p:spTree>
+      <p:nvGrpSpPr>
+        <p:cNvPr id="1" name=""/>
+        <p:cNvGrpSpPr/>
+        <p:nvPr/>
+      </p:nvGrpSpPr>
+      <p:grpSpPr>
+        <a:xfrm>
+          <a:off x="0" y="0"/>
+          <a:ext cx="0" cy="0"/>
+          <a:chOff x="0" y="0"/>
+          <a:chExt cx="0" cy="0"/>
+        </a:xfrm>
+      </p:grpSpPr>
+      <p:sp>
+        <p:nvSpPr>
+          <p:cNvPr id="2" name="Title 1">
+            <a:extLst>
+              <a:ext uri="{FF2B5EF4-FFF2-40B4-BE49-F238E27FC236}">
+                <a16:creationId xmlns:a16="http://schemas.microsoft.com/office/drawing/2014/main" id="{D5E867E5-804E-BA41-A335-18ED692CB6EE}"/>
+              </a:ext>
+            </a:extLst>
+          </p:cNvPr>
+          <p:cNvSpPr>
+            <a:spLocks noGrp="1"/>
+          </p:cNvSpPr>
+          <p:nvPr>
+            <p:ph type="title"/>
+          </p:nvPr>
+        </p:nvSpPr>
+        <p:spPr>
+          <a:xfrm>
+            <a:off x="12879" y="0"/>
+            <a:ext cx="12175946" cy="1143000"/>
+          </a:xfrm>
+        </p:spPr>
+        <p:txBody>
+          <a:bodyPr anchor="ctr">
+            <a:normAutofit/>
+          </a:bodyPr>
+          <a:lstStyle/>
+          <a:p>
+            <a:r>
+              <a:rPr lang="en-US" dirty="0"/>
+              <a:t>Candidate Feature Set</a:t>
+            </a:r>
+          </a:p>
+        </p:txBody>
+      </p:sp>
+      <p:sp>
+        <p:nvSpPr>
+          <p:cNvPr id="4" name="TextBox 3">
+            <a:extLst>
+              <a:ext uri="{FF2B5EF4-FFF2-40B4-BE49-F238E27FC236}">
+                <a16:creationId xmlns:a16="http://schemas.microsoft.com/office/drawing/2014/main" id="{D5F6012D-F036-B24B-B556-A67BB3413703}"/>
+              </a:ext>
+            </a:extLst>
+          </p:cNvPr>
+          <p:cNvSpPr txBox="1"/>
+          <p:nvPr/>
+        </p:nvSpPr>
+        <p:spPr>
+          <a:xfrm>
+            <a:off x="391886" y="1143000"/>
+            <a:ext cx="11109131" cy="4524315"/>
+          </a:xfrm>
+          <a:prstGeom prst="rect">
+            <a:avLst/>
+          </a:prstGeom>
+          <a:noFill/>
+        </p:spPr>
+        <p:txBody>
+          <a:bodyPr wrap="none" rtlCol="0">
+            <a:spAutoFit/>
+          </a:bodyPr>
+          <a:lstStyle/>
+          <a:p>
+            <a:endParaRPr lang="en-SG" sz="2400" b="1" dirty="0"/>
+          </a:p>
+          <a:p>
+            <a:pPr marL="285750" indent="-285750">
+              <a:buFont typeface="Arial" panose="020B0604020202020204" pitchFamily="34" charset="0"/>
+              <a:buChar char="•"/>
+            </a:pPr>
+            <a:r>
+              <a:rPr lang="en-SG" sz="2400" b="1" dirty="0"/>
+              <a:t>The feature set suggested by the feature explorer/recommender</a:t>
+            </a:r>
+            <a:endParaRPr lang="en-SG" sz="2400" dirty="0"/>
+          </a:p>
+          <a:p>
+            <a:pPr lvl="1"/>
+            <a:r>
+              <a:rPr lang="en-SG" sz="2400" i="1" dirty="0"/>
+              <a:t>loan denied</a:t>
+            </a:r>
+            <a:r>
+              <a:rPr lang="en-SG" sz="2400" dirty="0"/>
+              <a:t>, </a:t>
+            </a:r>
+            <a:r>
+              <a:rPr lang="en-SG" sz="2400" i="1" dirty="0"/>
+              <a:t>years of credit history</a:t>
+            </a:r>
+            <a:r>
+              <a:rPr lang="en-SG" sz="2400" dirty="0"/>
+              <a:t>, </a:t>
+            </a:r>
+            <a:r>
+              <a:rPr lang="en-SG" sz="2400" i="1" dirty="0"/>
+              <a:t>previous loan grant</a:t>
+            </a:r>
+            <a:r>
+              <a:rPr lang="en-SG" sz="2400" dirty="0"/>
+              <a:t>, </a:t>
+            </a:r>
+            <a:r>
+              <a:rPr lang="en-SG" sz="2400" i="1" dirty="0"/>
+              <a:t>credit history</a:t>
+            </a:r>
+          </a:p>
+          <a:p>
+            <a:pPr marL="285750" indent="-285750">
+              <a:buFont typeface="Arial" panose="020B0604020202020204" pitchFamily="34" charset="0"/>
+              <a:buChar char="•"/>
+            </a:pPr>
+            <a:endParaRPr lang="en-SG" sz="2400" b="1" dirty="0"/>
+          </a:p>
+          <a:p>
+            <a:pPr marL="285750" indent="-285750">
+              <a:buFont typeface="Arial" panose="020B0604020202020204" pitchFamily="34" charset="0"/>
+              <a:buChar char="•"/>
+            </a:pPr>
+            <a:r>
+              <a:rPr lang="en-SG" sz="2400" b="1" dirty="0"/>
+              <a:t>Custom features that may have been generated by the modeler</a:t>
+            </a:r>
+          </a:p>
+          <a:p>
+            <a:pPr lvl="1"/>
+            <a:r>
+              <a:rPr lang="en-SG" sz="2400" i="1" dirty="0"/>
+              <a:t>income per person, income credit percent, payment rate, </a:t>
+            </a:r>
+            <a:r>
+              <a:rPr lang="en-SG" sz="2400" dirty="0"/>
+              <a:t>etc</a:t>
+            </a:r>
+          </a:p>
+          <a:p>
+            <a:pPr lvl="1"/>
+            <a:r>
+              <a:rPr lang="en-SG" sz="2400" i="1" dirty="0"/>
+              <a:t>square of EXT_SOURCE_1, CNT_CHILDREN, </a:t>
+            </a:r>
+            <a:r>
+              <a:rPr lang="en-SG" sz="2400" dirty="0"/>
+              <a:t>etc</a:t>
+            </a:r>
+          </a:p>
+          <a:p>
+            <a:pPr lvl="1"/>
+            <a:r>
+              <a:rPr lang="en-SG" sz="2400" i="1" dirty="0"/>
+              <a:t>ln of AMT_GOODS_PRICE, AMT_INCOME_TOTAL, </a:t>
+            </a:r>
+            <a:r>
+              <a:rPr lang="en-SG" sz="2400" dirty="0"/>
+              <a:t>etc</a:t>
+            </a:r>
+          </a:p>
+          <a:p>
+            <a:pPr marL="285750" indent="-285750">
+              <a:buFont typeface="Arial" panose="020B0604020202020204" pitchFamily="34" charset="0"/>
+              <a:buChar char="•"/>
+            </a:pPr>
+            <a:endParaRPr lang="en-SG" sz="2400" b="1" dirty="0"/>
+          </a:p>
+          <a:p>
+            <a:pPr marL="285750" indent="-285750">
+              <a:buFont typeface="Arial" panose="020B0604020202020204" pitchFamily="34" charset="0"/>
+              <a:buChar char="•"/>
+            </a:pPr>
+            <a:r>
+              <a:rPr lang="en-SG" sz="2400" b="1" dirty="0"/>
+              <a:t>All the base “characteristic” attributes in the original data set</a:t>
+            </a:r>
+            <a:endParaRPr lang="en-SG" sz="2400" dirty="0"/>
+          </a:p>
+          <a:p>
+            <a:pPr lvl="1"/>
+            <a:r>
+              <a:rPr lang="en-SG" sz="2400" i="1" dirty="0"/>
+              <a:t>DAYS_EMPLOYED, DAYS_BIRTH, AMT_INCOME_TOTAL, AMT_CREDIT, </a:t>
+            </a:r>
+            <a:r>
+              <a:rPr lang="en-SG" sz="2400" dirty="0"/>
+              <a:t>etc</a:t>
+            </a:r>
+          </a:p>
+          <a:p>
+            <a:endParaRPr lang="en-US" sz="2400" dirty="0"/>
+          </a:p>
+        </p:txBody>
+      </p:sp>
+    </p:spTree>
+    <p:extLst>
+      <p:ext uri="{BB962C8B-B14F-4D97-AF65-F5344CB8AC3E}">
+        <p14:creationId xmlns:p14="http://schemas.microsoft.com/office/powerpoint/2010/main" val="1697963810"/>
+      </p:ext>
+    </p:extLst>
+  </p:cSld>
+  <p:clrMapOvr>
+    <a:masterClrMapping/>
+  </p:clrMapOvr>
+  <p:timing>
+    <p:tnLst>
+      <p:par>
+        <p:cTn id="1" dur="indefinite" restart="never" nodeType="tmRoot">
+          <p:childTnLst>
+            <p:seq concurrent="1" nextAc="seek">
+              <p:cTn id="2" dur="indefinite" nodeType="mainSeq">
+                <p:childTnLst>
+                  <p:par>
+                    <p:cTn id="3" fill="hold">
+                      <p:stCondLst>
+                        <p:cond delay="indefinite"/>
+                      </p:stCondLst>
+                      <p:childTnLst>
+                        <p:par>
+                          <p:cTn id="4" fill="hold">
+                            <p:stCondLst>
+                              <p:cond delay="0"/>
+                            </p:stCondLst>
+                            <p:childTnLst>
+                              <p:par>
+                                <p:cTn id="5" presetID="1" presetClass="entr" presetSubtype="0" fill="hold" nodeType="clickEffect">
+                                  <p:stCondLst>
+                                    <p:cond delay="0"/>
+                                  </p:stCondLst>
+                                  <p:childTnLst>
+                                    <p:set>
+                                      <p:cBhvr>
+                                        <p:cTn id="6" dur="1" fill="hold">
+                                          <p:stCondLst>
+                                            <p:cond delay="0"/>
+                                          </p:stCondLst>
+                                        </p:cTn>
+                                        <p:tgtEl>
+                                          <p:spTgt spid="4">
+                                            <p:txEl>
+                                              <p:pRg st="1" end="1"/>
+                                            </p:txEl>
+                                          </p:spTgt>
+                                        </p:tgtEl>
+                                        <p:attrNameLst>
+                                          <p:attrName>style.visibility</p:attrName>
+                                        </p:attrNameLst>
+                                      </p:cBhvr>
+                                      <p:to>
+                                        <p:strVal val="visible"/>
+                                      </p:to>
+                                    </p:set>
+                                  </p:childTnLst>
+                                </p:cTn>
+                              </p:par>
+                              <p:par>
+                                <p:cTn id="7" presetID="1" presetClass="entr" presetSubtype="0" fill="hold" nodeType="withEffect">
+                                  <p:stCondLst>
+                                    <p:cond delay="0"/>
+                                  </p:stCondLst>
+                                  <p:childTnLst>
+                                    <p:set>
+                                      <p:cBhvr>
+                                        <p:cTn id="8" dur="1" fill="hold">
+                                          <p:stCondLst>
+                                            <p:cond delay="0"/>
+                                          </p:stCondLst>
+                                        </p:cTn>
+                                        <p:tgtEl>
+                                          <p:spTgt spid="4">
+                                            <p:txEl>
+                                              <p:pRg st="2" end="2"/>
+                                            </p:txEl>
+                                          </p:spTgt>
+                                        </p:tgtEl>
+                                        <p:attrNameLst>
+                                          <p:attrName>style.visibility</p:attrName>
+                                        </p:attrNameLst>
+                                      </p:cBhvr>
+                                      <p:to>
+                                        <p:strVal val="visible"/>
+                                      </p:to>
+                                    </p:set>
+                                  </p:childTnLst>
+                                </p:cTn>
+                              </p:par>
+                            </p:childTnLst>
+                          </p:cTn>
+                        </p:par>
+                      </p:childTnLst>
+                    </p:cTn>
+                  </p:par>
+                  <p:par>
+                    <p:cTn id="9" fill="hold">
+                      <p:stCondLst>
+                        <p:cond delay="indefinite"/>
+                      </p:stCondLst>
+                      <p:childTnLst>
+                        <p:par>
+                          <p:cTn id="10" fill="hold">
+                            <p:stCondLst>
+                              <p:cond delay="0"/>
+                            </p:stCondLst>
+                            <p:childTnLst>
+                              <p:par>
+                                <p:cTn id="11" presetID="1" presetClass="entr" presetSubtype="0" fill="hold" nodeType="clickEffect">
+                                  <p:stCondLst>
+                                    <p:cond delay="0"/>
+                                  </p:stCondLst>
+                                  <p:childTnLst>
+                                    <p:set>
+                                      <p:cBhvr>
+                                        <p:cTn id="12" dur="1" fill="hold">
+                                          <p:stCondLst>
+                                            <p:cond delay="0"/>
+                                          </p:stCondLst>
+                                        </p:cTn>
+                                        <p:tgtEl>
+                                          <p:spTgt spid="4">
+                                            <p:txEl>
+                                              <p:pRg st="4" end="4"/>
+                                            </p:txEl>
+                                          </p:spTgt>
+                                        </p:tgtEl>
+                                        <p:attrNameLst>
+                                          <p:attrName>style.visibility</p:attrName>
+                                        </p:attrNameLst>
+                                      </p:cBhvr>
+                                      <p:to>
+                                        <p:strVal val="visible"/>
+                                      </p:to>
+                                    </p:set>
+                                  </p:childTnLst>
+                                </p:cTn>
+                              </p:par>
+                              <p:par>
+                                <p:cTn id="13" presetID="1" presetClass="entr" presetSubtype="0" fill="hold" nodeType="withEffect">
+                                  <p:stCondLst>
+                                    <p:cond delay="0"/>
+                                  </p:stCondLst>
+                                  <p:childTnLst>
+                                    <p:set>
+                                      <p:cBhvr>
+                                        <p:cTn id="14" dur="1" fill="hold">
+                                          <p:stCondLst>
+                                            <p:cond delay="0"/>
+                                          </p:stCondLst>
+                                        </p:cTn>
+                                        <p:tgtEl>
+                                          <p:spTgt spid="4">
+                                            <p:txEl>
+                                              <p:pRg st="5" end="5"/>
+                                            </p:txEl>
+                                          </p:spTgt>
+                                        </p:tgtEl>
+                                        <p:attrNameLst>
+                                          <p:attrName>style.visibility</p:attrName>
+                                        </p:attrNameLst>
+                                      </p:cBhvr>
+                                      <p:to>
+                                        <p:strVal val="visible"/>
+                                      </p:to>
+                                    </p:set>
+                                  </p:childTnLst>
+                                </p:cTn>
+                              </p:par>
+                              <p:par>
+                                <p:cTn id="15" presetID="1" presetClass="entr" presetSubtype="0" fill="hold" nodeType="withEffect">
+                                  <p:stCondLst>
+                                    <p:cond delay="0"/>
+                                  </p:stCondLst>
+                                  <p:childTnLst>
+                                    <p:set>
+                                      <p:cBhvr>
+                                        <p:cTn id="16" dur="1" fill="hold">
+                                          <p:stCondLst>
+                                            <p:cond delay="0"/>
+                                          </p:stCondLst>
+                                        </p:cTn>
+                                        <p:tgtEl>
+                                          <p:spTgt spid="4">
+                                            <p:txEl>
+                                              <p:pRg st="6" end="6"/>
+                                            </p:txEl>
+                                          </p:spTgt>
+                                        </p:tgtEl>
+                                        <p:attrNameLst>
+                                          <p:attrName>style.visibility</p:attrName>
+                                        </p:attrNameLst>
+                                      </p:cBhvr>
+                                      <p:to>
+                                        <p:strVal val="visible"/>
+                                      </p:to>
+                                    </p:set>
+                                  </p:childTnLst>
+                                </p:cTn>
+                              </p:par>
+                              <p:par>
+                                <p:cTn id="17" presetID="1" presetClass="entr" presetSubtype="0" fill="hold" nodeType="withEffect">
+                                  <p:stCondLst>
+                                    <p:cond delay="0"/>
+                                  </p:stCondLst>
+                                  <p:childTnLst>
+                                    <p:set>
+                                      <p:cBhvr>
+                                        <p:cTn id="18" dur="1" fill="hold">
+                                          <p:stCondLst>
+                                            <p:cond delay="0"/>
+                                          </p:stCondLst>
+                                        </p:cTn>
+                                        <p:tgtEl>
+                                          <p:spTgt spid="4">
+                                            <p:txEl>
+                                              <p:pRg st="7" end="7"/>
+                                            </p:txEl>
+                                          </p:spTgt>
+                                        </p:tgtEl>
+                                        <p:attrNameLst>
+                                          <p:attrName>style.visibility</p:attrName>
+                                        </p:attrNameLst>
+                                      </p:cBhvr>
+                                      <p:to>
+                                        <p:strVal val="visible"/>
+                                      </p:to>
+                                    </p:set>
+                                  </p:childTnLst>
+                                </p:cTn>
+                              </p:par>
+                            </p:childTnLst>
+                          </p:cTn>
+                        </p:par>
+                      </p:childTnLst>
+                    </p:cTn>
+                  </p:par>
+                  <p:par>
+                    <p:cTn id="19" fill="hold">
+                      <p:stCondLst>
+                        <p:cond delay="indefinite"/>
+                      </p:stCondLst>
+                      <p:childTnLst>
+                        <p:par>
+                          <p:cTn id="20" fill="hold">
+                            <p:stCondLst>
+                              <p:cond delay="0"/>
+                            </p:stCondLst>
+                            <p:childTnLst>
+                              <p:par>
+                                <p:cTn id="21" presetID="1" presetClass="entr" presetSubtype="0" fill="hold" nodeType="clickEffect">
+                                  <p:stCondLst>
+                                    <p:cond delay="0"/>
+                                  </p:stCondLst>
+                                  <p:childTnLst>
+                                    <p:set>
+                                      <p:cBhvr>
+                                        <p:cTn id="22" dur="1" fill="hold">
+                                          <p:stCondLst>
+                                            <p:cond delay="0"/>
+                                          </p:stCondLst>
+                                        </p:cTn>
+                                        <p:tgtEl>
+                                          <p:spTgt spid="4">
+                                            <p:txEl>
+                                              <p:pRg st="9" end="9"/>
+                                            </p:txEl>
+                                          </p:spTgt>
+                                        </p:tgtEl>
+                                        <p:attrNameLst>
+                                          <p:attrName>style.visibility</p:attrName>
+                                        </p:attrNameLst>
+                                      </p:cBhvr>
+                                      <p:to>
+                                        <p:strVal val="visible"/>
+                                      </p:to>
+                                    </p:set>
+                                  </p:childTnLst>
+                                </p:cTn>
+                              </p:par>
+                              <p:par>
+                                <p:cTn id="23" presetID="1" presetClass="entr" presetSubtype="0" fill="hold" nodeType="withEffect">
+                                  <p:stCondLst>
+                                    <p:cond delay="0"/>
+                                  </p:stCondLst>
+                                  <p:childTnLst>
+                                    <p:set>
+                                      <p:cBhvr>
+                                        <p:cTn id="24" dur="1" fill="hold">
+                                          <p:stCondLst>
+                                            <p:cond delay="0"/>
+                                          </p:stCondLst>
+                                        </p:cTn>
+                                        <p:tgtEl>
+                                          <p:spTgt spid="4">
+                                            <p:txEl>
+                                              <p:pRg st="10" end="10"/>
+                                            </p:txEl>
+                                          </p:spTgt>
+                                        </p:tgtEl>
+                                        <p:attrNameLst>
+                                          <p:attrName>style.visibility</p:attrName>
+                                        </p:attrNameLst>
+                                      </p:cBhvr>
+                                      <p:to>
+                                        <p:strVal val="visible"/>
+                                      </p:to>
+                                    </p:set>
+                                  </p:childTnLst>
+                                </p:cTn>
+                              </p:par>
+                            </p:childTnLst>
+                          </p:cTn>
+                        </p:par>
+                      </p:childTnLst>
+                    </p:cTn>
+                  </p:par>
+                </p:childTnLst>
+              </p:cTn>
+              <p:prevCondLst>
+                <p:cond evt="onPrev" delay="0">
+                  <p:tgtEl>
+                    <p:sldTgt/>
+                  </p:tgtEl>
+                </p:cond>
+              </p:prevCondLst>
+              <p:nextCondLst>
+                <p:cond evt="onNext" delay="0">
+                  <p:tgtEl>
+                    <p:sldTgt/>
+                  </p:tgtEl>
+                </p:cond>
+              </p:nextCondLst>
+            </p:seq>
+          </p:childTnLst>
+        </p:cTn>
+      </p:par>
+    </p:tnLst>
+  </p:timing>
+</p:sld>
+</file>
+
+<file path=ppt/slides/slide8.xml><?xml version="1.0" encoding="utf-8"?>
+<p:sld xmlns:a="http://schemas.openxmlformats.org/drawingml/2006/main" xmlns:r="http://schemas.openxmlformats.org/officeDocument/2006/relationships" xmlns:p="http://schemas.openxmlformats.org/presentationml/2006/main">
+  <p:cSld>
+    <p:spTree>
+      <p:nvGrpSpPr>
+        <p:cNvPr id="1" name=""/>
+        <p:cNvGrpSpPr/>
+        <p:nvPr/>
+      </p:nvGrpSpPr>
+      <p:grpSpPr>
+        <a:xfrm>
+          <a:off x="0" y="0"/>
+          <a:ext cx="0" cy="0"/>
+          <a:chOff x="0" y="0"/>
+          <a:chExt cx="0" cy="0"/>
+        </a:xfrm>
+      </p:grpSpPr>
+      <p:sp>
+        <p:nvSpPr>
+          <p:cNvPr id="2" name="Title 1">
+            <a:extLst>
+              <a:ext uri="{FF2B5EF4-FFF2-40B4-BE49-F238E27FC236}">
+                <a16:creationId xmlns:a16="http://schemas.microsoft.com/office/drawing/2014/main" id="{B282E4F7-0C34-8F41-B239-EBA7C2E850EB}"/>
+              </a:ext>
+            </a:extLst>
+          </p:cNvPr>
+          <p:cNvSpPr>
+            <a:spLocks noGrp="1"/>
+          </p:cNvSpPr>
+          <p:nvPr>
+            <p:ph type="title"/>
+          </p:nvPr>
+        </p:nvSpPr>
+        <p:spPr/>
+        <p:txBody>
+          <a:bodyPr/>
+          <a:lstStyle/>
+          <a:p>
+            <a:r>
+              <a:rPr lang="en-US" dirty="0"/>
+              <a:t>Model Ready Features</a:t>
+            </a:r>
+          </a:p>
+        </p:txBody>
+      </p:sp>
+      <p:sp>
+        <p:nvSpPr>
+          <p:cNvPr id="3" name="Rectangle 2">
+            <a:extLst>
+              <a:ext uri="{FF2B5EF4-FFF2-40B4-BE49-F238E27FC236}">
+                <a16:creationId xmlns:a16="http://schemas.microsoft.com/office/drawing/2014/main" id="{AD5454E4-69AE-5CCE-70AD-F446C40F5279}"/>
+              </a:ext>
+            </a:extLst>
+          </p:cNvPr>
+          <p:cNvSpPr/>
+          <p:nvPr/>
+        </p:nvSpPr>
+        <p:spPr>
+          <a:xfrm>
+            <a:off x="1490596" y="1143000"/>
+            <a:ext cx="8542751" cy="4647426"/>
+          </a:xfrm>
+          <a:prstGeom prst="rect">
+            <a:avLst/>
+          </a:prstGeom>
+        </p:spPr>
+        <p:txBody>
+          <a:bodyPr wrap="square">
+            <a:spAutoFit/>
+          </a:bodyPr>
+          <a:lstStyle/>
+          <a:p>
+            <a:pPr marL="171450" indent="-171450">
+              <a:buFont typeface="Arial" panose="020B0604020202020204" pitchFamily="34" charset="0"/>
+              <a:buChar char="•"/>
+            </a:pPr>
+            <a:r>
+              <a:rPr lang="en-US" sz="1600" dirty="0"/>
+              <a:t>Pruned Feature set from the existing features</a:t>
+            </a:r>
+          </a:p>
+          <a:p>
+            <a:endParaRPr lang="en-US" sz="1200" dirty="0"/>
+          </a:p>
+          <a:p>
+            <a:r>
+              <a:rPr lang="en-US" sz="1200" dirty="0"/>
+              <a:t>CNT_CHILDREN, REGION_POPULATION_RELATIVE, FLAG_EMP_PHONE, FLAG_WORK_PHONE, FLAG_PHONE, FLAG_EMAIL, CNT_FAM_MEMBERS, REGION_RATING_CLIENT, REGION_RATING_CLIENT_W_CITY, HOUR_APPR_PROCESS_START, REG_REGION_NOT_LIVE_REGION, REG_REGION_NOT_WORK_REGION, LIVE_REGION_NOT_WORK_REGION, REG_CITY_NOT_LIVE_CITY, REG_CITY_NOT_WORK_CITY, LIVE_CITY_NOT_WORK_CITY, EXT_SOURCE_1, EXT_SOURCE_2, EXT_SOURCE_3, LANDAREA_AVG, BASEMENTAREA_MODE, YEARS_BEGINEXPLUATATION_MODE, ELEVATORS_MODE, ENTRANCES_MODE, FLOORSMAX_MODE, OBS_30_CNT_SOCIAL_CIRCLE, DEF_30_CNT_SOCIAL_CIRCLE, OBS_60_CNT_SOCIAL_CIRCLE, DEF_60_CNT_SOCIAL_CIRCLE, FLAG_DOCUMENT_3, FLAG_DOCUMENT_5, FLAG_DOCUMENT_6, FLAG_DOCUMENT_8, FLAG_DOCUMENT_11, AMT_REQ_CREDIT_BUREAU_HOUR, AMT_REQ_CREDIT_BUREAU_DAY, AMT_REQ_CREDIT_BUREAU_WEEK, AMT_REQ_CREDIT_BUREAU_MON, AMT_REQ_CREDIT_BUREAU_QRT, AMT_REQ_CREDIT_BUREAU_YEAR, DAYS_REGISTRATION, DAYS_BIRTH, DAYS_EMPLOYED, DAYS_ID_PUBLISH, DAYS_LAST_PHONE_CHANGE, NAME_HOUSING_TYPE, NAME_INCOME_TYPE, NAME_EDUCATION_TYPE, WEEKDAY_APPR_PROCESS_START, NAME_CONTRACT_TYPE, CNT_PREV_REFUSED_APP, DAYS_PREV_CREDIT_HISTORY, </a:t>
+            </a:r>
+          </a:p>
+          <a:p>
+            <a:pPr marL="171450" indent="-171450">
+              <a:buFont typeface="Arial" panose="020B0604020202020204" pitchFamily="34" charset="0"/>
+              <a:buChar char="•"/>
+            </a:pPr>
+            <a:r>
+              <a:rPr lang="en-US" sz="1600" dirty="0"/>
+              <a:t>Newly Composed Features</a:t>
+            </a:r>
+          </a:p>
+          <a:p>
+            <a:r>
+              <a:rPr lang="en-US" sz="1200" dirty="0"/>
+              <a:t>AMT_PREV_CREDIT_MIN, AMT_PREV_CREDIT_MAX, AMT_PREV_CREDIT_MEAN, CNT_PREV_APPROVED_APP, DAYS_EMPLOYED_PERC, INCOME_CREDIT_PERC, INCOME_PER_PERSON, ANNUITY_INCOME_PERC, PAYMENT_RATE, DAYS_START_EMPLOYED, EXT_SOURCE_1_sq, </a:t>
+            </a:r>
+            <a:r>
+              <a:rPr lang="en-US" sz="1200" dirty="0" err="1"/>
+              <a:t>CNT_CHILDREN_sq</a:t>
+            </a:r>
+            <a:r>
+              <a:rPr lang="en-US" sz="1200" dirty="0"/>
+              <a:t>, EXT_SOURCE_2_sq, EXT_SOURCE_3_sq, WALLSMATERIAL_MODE, OCCUPATION_TYPE, CODE_GENDER, NAME_TYPE_SUITE, NAME_FAMILY_STATUS, ORGANIZATION_TYPE, </a:t>
+            </a:r>
+            <a:r>
+              <a:rPr lang="en-US" sz="1200" dirty="0" err="1"/>
+              <a:t>AMT_GOODS_PRICE_ln_scaled</a:t>
+            </a:r>
+            <a:r>
+              <a:rPr lang="en-US" sz="1200" dirty="0"/>
+              <a:t>, </a:t>
+            </a:r>
+            <a:r>
+              <a:rPr lang="en-US" sz="1200" dirty="0" err="1"/>
+              <a:t>AMT_INCOME_TOTAL_scaled</a:t>
+            </a:r>
+            <a:r>
+              <a:rPr lang="en-US" sz="1200" dirty="0"/>
+              <a:t>, </a:t>
+            </a:r>
+            <a:r>
+              <a:rPr lang="en-US" sz="1200" dirty="0" err="1"/>
+              <a:t>AMT_GOODS_PRICE_scaled</a:t>
+            </a:r>
+            <a:r>
+              <a:rPr lang="en-US" sz="1200" dirty="0"/>
+              <a:t>, </a:t>
+            </a:r>
+            <a:r>
+              <a:rPr lang="en-US" sz="1200" dirty="0" err="1"/>
+              <a:t>AMT_CREDIT_scaled</a:t>
+            </a:r>
+            <a:r>
+              <a:rPr lang="en-US" sz="1200" dirty="0"/>
+              <a:t>, </a:t>
+            </a:r>
+            <a:r>
+              <a:rPr lang="en-US" sz="1200" dirty="0" err="1"/>
+              <a:t>AMT_INCOME_TOTAL_ln_scaled</a:t>
+            </a:r>
+            <a:r>
+              <a:rPr lang="en-US" sz="1200" dirty="0"/>
+              <a:t>, </a:t>
+            </a:r>
+            <a:r>
+              <a:rPr lang="en-US" sz="1200" dirty="0" err="1"/>
+              <a:t>AMT_ANNUITY_ln_scaled</a:t>
+            </a:r>
+            <a:r>
+              <a:rPr lang="en-US" sz="1200" dirty="0"/>
+              <a:t>, </a:t>
+            </a:r>
+            <a:r>
+              <a:rPr lang="en-US" sz="1200" dirty="0" err="1"/>
+              <a:t>AMT_CREDIT_ln_scaled</a:t>
+            </a:r>
+            <a:r>
+              <a:rPr lang="en-US" sz="1200" dirty="0"/>
+              <a:t>, </a:t>
+            </a:r>
+            <a:r>
+              <a:rPr lang="en-US" sz="1200" dirty="0" err="1"/>
+              <a:t>AMT_ANNUITY_scaled</a:t>
+            </a:r>
+            <a:r>
+              <a:rPr lang="en-US" sz="1200" dirty="0"/>
+              <a:t>, latent_0, latent_1, latent_2, latent_3</a:t>
+            </a:r>
+          </a:p>
+        </p:txBody>
+      </p:sp>
+    </p:spTree>
+    <p:extLst>
+      <p:ext uri="{BB962C8B-B14F-4D97-AF65-F5344CB8AC3E}">
+        <p14:creationId xmlns:p14="http://schemas.microsoft.com/office/powerpoint/2010/main" val="4098638788"/>
+      </p:ext>
+    </p:extLst>
+  </p:cSld>
+  <p:clrMapOvr>
+    <a:masterClrMapping/>
+  </p:clrMapOvr>
 </p:sld>
 </file>
 
@@ -6001,16 +6748,16 @@
 <file path=customXml/itemProps2.xml><?xml version="1.0" encoding="utf-8"?>
 <ds:datastoreItem xmlns:ds="http://schemas.openxmlformats.org/officeDocument/2006/customXml" ds:itemID="{669553B3-A8C7-4895-AC3F-E12F960FAFA8}">
   <ds:schemaRefs>
-    <ds:schemaRef ds:uri="http://purl.org/dc/elements/1.1/"/>
     <ds:schemaRef ds:uri="http://purl.org/dc/terms/"/>
-    <ds:schemaRef ds:uri="http://schemas.microsoft.com/office/infopath/2007/PartnerControls"/>
     <ds:schemaRef ds:uri="http://schemas.microsoft.com/office/2006/documentManagement/types"/>
+    <ds:schemaRef ds:uri="http://schemas.openxmlformats.org/package/2006/metadata/core-properties"/>
     <ds:schemaRef ds:uri="http://schemas.microsoft.com/office/2006/metadata/properties"/>
     <ds:schemaRef ds:uri="http://purl.org/dc/dcmitype/"/>
+    <ds:schemaRef ds:uri="http://purl.org/dc/elements/1.1/"/>
     <ds:schemaRef ds:uri="http://www.w3.org/XML/1998/namespace"/>
+    <ds:schemaRef ds:uri="http://schemas.microsoft.com/office/infopath/2007/PartnerControls"/>
+    <ds:schemaRef ds:uri="96efcc39-b2e5-4f7b-aaab-c972485de1d7"/>
     <ds:schemaRef ds:uri="33818b7f-41cc-44b6-a9db-494870eb7fa7"/>
-    <ds:schemaRef ds:uri="http://schemas.openxmlformats.org/package/2006/metadata/core-properties"/>
-    <ds:schemaRef ds:uri="96efcc39-b2e5-4f7b-aaab-c972485de1d7"/>
   </ds:schemaRefs>
 </ds:datastoreItem>
 </file>
@@ -6018,18 +6765,18 @@
 <file path=customXml/itemProps3.xml><?xml version="1.0" encoding="utf-8"?>
 <ds:datastoreItem xmlns:ds="http://schemas.openxmlformats.org/officeDocument/2006/customXml" ds:itemID="{3474E60F-3949-4DF9-BBB4-C370DB02D594}">
   <ds:schemaRefs>
-    <ds:schemaRef ds:uri="http://schemas.microsoft.com/office/2006/metadata/contentType"/>
-    <ds:schemaRef ds:uri="http://schemas.microsoft.com/office/2006/metadata/properties/metaAttributes"/>
-    <ds:schemaRef ds:uri="http://www.w3.org/2001/XMLSchema"/>
-    <ds:schemaRef ds:uri="http://schemas.microsoft.com/office/2006/metadata/properties"/>
     <ds:schemaRef ds:uri="33818b7f-41cc-44b6-a9db-494870eb7fa7"/>
     <ds:schemaRef ds:uri="96efcc39-b2e5-4f7b-aaab-c972485de1d7"/>
-    <ds:schemaRef ds:uri="http://schemas.microsoft.com/office/2006/documentManagement/types"/>
-    <ds:schemaRef ds:uri="http://schemas.microsoft.com/office/infopath/2007/PartnerControls"/>
-    <ds:schemaRef ds:uri="http://schemas.openxmlformats.org/package/2006/metadata/core-properties"/>
     <ds:schemaRef ds:uri="http://purl.org/dc/elements/1.1/"/>
     <ds:schemaRef ds:uri="http://purl.org/dc/terms/"/>
     <ds:schemaRef ds:uri="http://schemas.microsoft.com/internal/obd"/>
+    <ds:schemaRef ds:uri="http://schemas.microsoft.com/office/2006/documentManagement/types"/>
+    <ds:schemaRef ds:uri="http://schemas.microsoft.com/office/2006/metadata/contentType"/>
+    <ds:schemaRef ds:uri="http://schemas.microsoft.com/office/2006/metadata/properties"/>
+    <ds:schemaRef ds:uri="http://schemas.microsoft.com/office/2006/metadata/properties/metaAttributes"/>
+    <ds:schemaRef ds:uri="http://schemas.microsoft.com/office/infopath/2007/PartnerControls"/>
+    <ds:schemaRef ds:uri="http://schemas.openxmlformats.org/package/2006/metadata/core-properties"/>
+    <ds:schemaRef ds:uri="http://www.w3.org/2001/XMLSchema"/>
   </ds:schemaRefs>
 </ds:datastoreItem>
 </file>
</xml_diff>